<commit_message>
Move day 4 demo 1 to the last
</commit_message>
<xml_diff>
--- a/Day_4/Lectures/Day_4_Lecture_2_Model_Tuning_Interpretation_Deployment.pptx
+++ b/Day_4/Lectures/Day_4_Lecture_2_Model_Tuning_Interpretation_Deployment.pptx
@@ -910,7 +910,7 @@
   <p:cSld>
     <p:spTree>
       <p:nvGrpSpPr>
-        <p:cNvPr id="254" name="Shape 254"/>
+        <p:cNvPr id="256" name="Shape 256"/>
         <p:cNvGrpSpPr/>
         <p:nvPr/>
       </p:nvGrpSpPr>
@@ -924,7 +924,7 @@
       </p:grpSpPr>
       <p:sp>
         <p:nvSpPr>
-          <p:cNvPr id="255" name="Google Shape;255;g111b5833a4e_0_153:notes"/>
+          <p:cNvPr id="257" name="Google Shape;257;g111b5833a4e_0_153:notes"/>
           <p:cNvSpPr/>
           <p:nvPr>
             <p:ph idx="2" type="sldImg"/>
@@ -959,7 +959,7 @@
       </p:sp>
       <p:sp>
         <p:nvSpPr>
-          <p:cNvPr id="256" name="Google Shape;256;g111b5833a4e_0_153:notes"/>
+          <p:cNvPr id="258" name="Google Shape;258;g111b5833a4e_0_153:notes"/>
           <p:cNvSpPr txBox="1"/>
           <p:nvPr>
             <p:ph idx="1" type="body"/>
@@ -1009,7 +1009,7 @@
   <p:cSld>
     <p:spTree>
       <p:nvGrpSpPr>
-        <p:cNvPr id="264" name="Shape 264"/>
+        <p:cNvPr id="266" name="Shape 266"/>
         <p:cNvGrpSpPr/>
         <p:nvPr/>
       </p:nvGrpSpPr>
@@ -1023,7 +1023,7 @@
       </p:grpSpPr>
       <p:sp>
         <p:nvSpPr>
-          <p:cNvPr id="265" name="Google Shape;265;g111984a9035_0_38:notes"/>
+          <p:cNvPr id="267" name="Google Shape;267;g111984a9035_0_38:notes"/>
           <p:cNvSpPr/>
           <p:nvPr>
             <p:ph idx="2" type="sldImg"/>
@@ -1058,7 +1058,7 @@
       </p:sp>
       <p:sp>
         <p:nvSpPr>
-          <p:cNvPr id="266" name="Google Shape;266;g111984a9035_0_38:notes"/>
+          <p:cNvPr id="268" name="Google Shape;268;g111984a9035_0_38:notes"/>
           <p:cNvSpPr txBox="1"/>
           <p:nvPr>
             <p:ph idx="1" type="body"/>
@@ -1108,7 +1108,7 @@
   <p:cSld>
     <p:spTree>
       <p:nvGrpSpPr>
-        <p:cNvPr id="275" name="Shape 275"/>
+        <p:cNvPr id="277" name="Shape 277"/>
         <p:cNvGrpSpPr/>
         <p:nvPr/>
       </p:nvGrpSpPr>
@@ -1122,7 +1122,7 @@
       </p:grpSpPr>
       <p:sp>
         <p:nvSpPr>
-          <p:cNvPr id="276" name="Google Shape;276;g111984a9035_0_46:notes"/>
+          <p:cNvPr id="278" name="Google Shape;278;g111984a9035_0_46:notes"/>
           <p:cNvSpPr/>
           <p:nvPr>
             <p:ph idx="2" type="sldImg"/>
@@ -1157,7 +1157,7 @@
       </p:sp>
       <p:sp>
         <p:nvSpPr>
-          <p:cNvPr id="277" name="Google Shape;277;g111984a9035_0_46:notes"/>
+          <p:cNvPr id="279" name="Google Shape;279;g111984a9035_0_46:notes"/>
           <p:cNvSpPr txBox="1"/>
           <p:nvPr>
             <p:ph idx="1" type="body"/>
@@ -1207,7 +1207,7 @@
   <p:cSld>
     <p:spTree>
       <p:nvGrpSpPr>
-        <p:cNvPr id="285" name="Shape 285"/>
+        <p:cNvPr id="287" name="Shape 287"/>
         <p:cNvGrpSpPr/>
         <p:nvPr/>
       </p:nvGrpSpPr>
@@ -1221,7 +1221,7 @@
       </p:grpSpPr>
       <p:sp>
         <p:nvSpPr>
-          <p:cNvPr id="286" name="Google Shape;286;g111984a9035_0_73:notes"/>
+          <p:cNvPr id="288" name="Google Shape;288;g111984a9035_0_73:notes"/>
           <p:cNvSpPr/>
           <p:nvPr>
             <p:ph idx="2" type="sldImg"/>
@@ -1256,7 +1256,7 @@
       </p:sp>
       <p:sp>
         <p:nvSpPr>
-          <p:cNvPr id="287" name="Google Shape;287;g111984a9035_0_73:notes"/>
+          <p:cNvPr id="289" name="Google Shape;289;g111984a9035_0_73:notes"/>
           <p:cNvSpPr txBox="1"/>
           <p:nvPr>
             <p:ph idx="1" type="body"/>
@@ -1306,7 +1306,7 @@
   <p:cSld>
     <p:spTree>
       <p:nvGrpSpPr>
-        <p:cNvPr id="296" name="Shape 296"/>
+        <p:cNvPr id="298" name="Shape 298"/>
         <p:cNvGrpSpPr/>
         <p:nvPr/>
       </p:nvGrpSpPr>
@@ -1320,7 +1320,7 @@
       </p:grpSpPr>
       <p:sp>
         <p:nvSpPr>
-          <p:cNvPr id="297" name="Google Shape;297;g111b5833a4e_0_34:notes"/>
+          <p:cNvPr id="299" name="Google Shape;299;g111b5833a4e_0_34:notes"/>
           <p:cNvSpPr/>
           <p:nvPr>
             <p:ph idx="2" type="sldImg"/>
@@ -1355,7 +1355,7 @@
       </p:sp>
       <p:sp>
         <p:nvSpPr>
-          <p:cNvPr id="298" name="Google Shape;298;g111b5833a4e_0_34:notes"/>
+          <p:cNvPr id="300" name="Google Shape;300;g111b5833a4e_0_34:notes"/>
           <p:cNvSpPr txBox="1"/>
           <p:nvPr>
             <p:ph idx="1" type="body"/>
@@ -1405,7 +1405,7 @@
   <p:cSld>
     <p:spTree>
       <p:nvGrpSpPr>
-        <p:cNvPr id="304" name="Shape 304"/>
+        <p:cNvPr id="306" name="Shape 306"/>
         <p:cNvGrpSpPr/>
         <p:nvPr/>
       </p:nvGrpSpPr>
@@ -1419,7 +1419,7 @@
       </p:grpSpPr>
       <p:sp>
         <p:nvSpPr>
-          <p:cNvPr id="305" name="Google Shape;305;g11c1490d445_0_1:notes"/>
+          <p:cNvPr id="307" name="Google Shape;307;g11c1490d445_0_1:notes"/>
           <p:cNvSpPr/>
           <p:nvPr>
             <p:ph idx="2" type="sldImg"/>
@@ -1454,7 +1454,7 @@
       </p:sp>
       <p:sp>
         <p:nvSpPr>
-          <p:cNvPr id="306" name="Google Shape;306;g11c1490d445_0_1:notes"/>
+          <p:cNvPr id="308" name="Google Shape;308;g11c1490d445_0_1:notes"/>
           <p:cNvSpPr txBox="1"/>
           <p:nvPr>
             <p:ph idx="1" type="body"/>
@@ -1504,7 +1504,7 @@
   <p:cSld>
     <p:spTree>
       <p:nvGrpSpPr>
-        <p:cNvPr id="313" name="Shape 313"/>
+        <p:cNvPr id="315" name="Shape 315"/>
         <p:cNvGrpSpPr/>
         <p:nvPr/>
       </p:nvGrpSpPr>
@@ -1518,7 +1518,7 @@
       </p:grpSpPr>
       <p:sp>
         <p:nvSpPr>
-          <p:cNvPr id="314" name="Google Shape;314;g111b5833a4e_0_43:notes"/>
+          <p:cNvPr id="316" name="Google Shape;316;g111b5833a4e_0_43:notes"/>
           <p:cNvSpPr/>
           <p:nvPr>
             <p:ph idx="2" type="sldImg"/>
@@ -1553,7 +1553,7 @@
       </p:sp>
       <p:sp>
         <p:nvSpPr>
-          <p:cNvPr id="315" name="Google Shape;315;g111b5833a4e_0_43:notes"/>
+          <p:cNvPr id="317" name="Google Shape;317;g111b5833a4e_0_43:notes"/>
           <p:cNvSpPr txBox="1"/>
           <p:nvPr>
             <p:ph idx="1" type="body"/>
@@ -1603,7 +1603,7 @@
   <p:cSld>
     <p:spTree>
       <p:nvGrpSpPr>
-        <p:cNvPr id="322" name="Shape 322"/>
+        <p:cNvPr id="324" name="Shape 324"/>
         <p:cNvGrpSpPr/>
         <p:nvPr/>
       </p:nvGrpSpPr>
@@ -1617,7 +1617,7 @@
       </p:grpSpPr>
       <p:sp>
         <p:nvSpPr>
-          <p:cNvPr id="323" name="Google Shape;323;g111b5833a4e_0_50:notes"/>
+          <p:cNvPr id="325" name="Google Shape;325;g111b5833a4e_0_50:notes"/>
           <p:cNvSpPr/>
           <p:nvPr>
             <p:ph idx="2" type="sldImg"/>
@@ -1652,7 +1652,7 @@
       </p:sp>
       <p:sp>
         <p:nvSpPr>
-          <p:cNvPr id="324" name="Google Shape;324;g111b5833a4e_0_50:notes"/>
+          <p:cNvPr id="326" name="Google Shape;326;g111b5833a4e_0_50:notes"/>
           <p:cNvSpPr txBox="1"/>
           <p:nvPr>
             <p:ph idx="1" type="body"/>
@@ -1673,9 +1673,40 @@
           </a:bodyPr>
           <a:lstStyle/>
           <a:p>
+            <a:pPr indent="-323850" lvl="0" marL="457200" rtl="0" algn="l">
+              <a:lnSpc>
+                <a:spcPct val="115000"/>
+              </a:lnSpc>
+              <a:spcBef>
+                <a:spcPts val="0"/>
+              </a:spcBef>
+              <a:spcAft>
+                <a:spcPts val="0"/>
+              </a:spcAft>
+              <a:buClr>
+                <a:schemeClr val="dk1"/>
+              </a:buClr>
+              <a:buSzPts val="1500"/>
+              <a:buChar char="●"/>
+            </a:pPr>
+            <a:r>
+              <a:rPr lang="en" sz="1500">
+                <a:solidFill>
+                  <a:schemeClr val="dk1"/>
+                </a:solidFill>
+              </a:rPr>
+              <a:t>The philosophy of Skater is that all models should be evaluated as black boxes and decision criteria of the models are inferred and interpreted based on input perturbations and observing the corresponding output predictions.</a:t>
+            </a:r>
+            <a:endParaRPr sz="1500">
+              <a:solidFill>
+                <a:schemeClr val="dk1"/>
+              </a:solidFill>
+            </a:endParaRPr>
+          </a:p>
+          <a:p>
             <a:pPr indent="0" lvl="0" marL="0" rtl="0" algn="l">
               <a:spcBef>
-                <a:spcPts val="0"/>
+                <a:spcPts val="1000"/>
               </a:spcBef>
               <a:spcAft>
                 <a:spcPts val="0"/>
@@ -1702,7 +1733,7 @@
   <p:cSld>
     <p:spTree>
       <p:nvGrpSpPr>
-        <p:cNvPr id="332" name="Shape 332"/>
+        <p:cNvPr id="334" name="Shape 334"/>
         <p:cNvGrpSpPr/>
         <p:nvPr/>
       </p:nvGrpSpPr>
@@ -1716,7 +1747,7 @@
       </p:grpSpPr>
       <p:sp>
         <p:nvSpPr>
-          <p:cNvPr id="333" name="Google Shape;333;g11c1490d445_0_9:notes"/>
+          <p:cNvPr id="335" name="Google Shape;335;g11c1490d445_0_9:notes"/>
           <p:cNvSpPr/>
           <p:nvPr>
             <p:ph idx="2" type="sldImg"/>
@@ -1751,7 +1782,7 @@
       </p:sp>
       <p:sp>
         <p:nvSpPr>
-          <p:cNvPr id="334" name="Google Shape;334;g11c1490d445_0_9:notes"/>
+          <p:cNvPr id="336" name="Google Shape;336;g11c1490d445_0_9:notes"/>
           <p:cNvSpPr txBox="1"/>
           <p:nvPr>
             <p:ph idx="1" type="body"/>
@@ -1801,7 +1832,7 @@
   <p:cSld>
     <p:spTree>
       <p:nvGrpSpPr>
-        <p:cNvPr id="341" name="Shape 341"/>
+        <p:cNvPr id="343" name="Shape 343"/>
         <p:cNvGrpSpPr/>
         <p:nvPr/>
       </p:nvGrpSpPr>
@@ -1815,7 +1846,7 @@
       </p:grpSpPr>
       <p:sp>
         <p:nvSpPr>
-          <p:cNvPr id="342" name="Google Shape;342;g111b5833a4e_0_65:notes"/>
+          <p:cNvPr id="344" name="Google Shape;344;g111b5833a4e_0_65:notes"/>
           <p:cNvSpPr/>
           <p:nvPr>
             <p:ph idx="2" type="sldImg"/>
@@ -1850,7 +1881,7 @@
       </p:sp>
       <p:sp>
         <p:nvSpPr>
-          <p:cNvPr id="343" name="Google Shape;343;g111b5833a4e_0_65:notes"/>
+          <p:cNvPr id="345" name="Google Shape;345;g111b5833a4e_0_65:notes"/>
           <p:cNvSpPr txBox="1"/>
           <p:nvPr>
             <p:ph idx="1" type="body"/>
@@ -1999,7 +2030,7 @@
   <p:cSld>
     <p:spTree>
       <p:nvGrpSpPr>
-        <p:cNvPr id="349" name="Shape 349"/>
+        <p:cNvPr id="351" name="Shape 351"/>
         <p:cNvGrpSpPr/>
         <p:nvPr/>
       </p:nvGrpSpPr>
@@ -2013,7 +2044,7 @@
       </p:grpSpPr>
       <p:sp>
         <p:nvSpPr>
-          <p:cNvPr id="350" name="Google Shape;350;g111b5833a4e_0_71:notes"/>
+          <p:cNvPr id="352" name="Google Shape;352;g111b5833a4e_0_71:notes"/>
           <p:cNvSpPr/>
           <p:nvPr>
             <p:ph idx="2" type="sldImg"/>
@@ -2048,7 +2079,7 @@
       </p:sp>
       <p:sp>
         <p:nvSpPr>
-          <p:cNvPr id="351" name="Google Shape;351;g111b5833a4e_0_71:notes"/>
+          <p:cNvPr id="353" name="Google Shape;353;g111b5833a4e_0_71:notes"/>
           <p:cNvSpPr txBox="1"/>
           <p:nvPr>
             <p:ph idx="1" type="body"/>
@@ -2098,7 +2129,7 @@
   <p:cSld>
     <p:spTree>
       <p:nvGrpSpPr>
-        <p:cNvPr id="357" name="Shape 357"/>
+        <p:cNvPr id="359" name="Shape 359"/>
         <p:cNvGrpSpPr/>
         <p:nvPr/>
       </p:nvGrpSpPr>
@@ -2112,7 +2143,7 @@
       </p:grpSpPr>
       <p:sp>
         <p:nvSpPr>
-          <p:cNvPr id="358" name="Google Shape;358;g11b9f8cd8a3_0_64:notes"/>
+          <p:cNvPr id="360" name="Google Shape;360;g11b9f8cd8a3_0_64:notes"/>
           <p:cNvSpPr/>
           <p:nvPr>
             <p:ph idx="2" type="sldImg"/>
@@ -2147,7 +2178,7 @@
       </p:sp>
       <p:sp>
         <p:nvSpPr>
-          <p:cNvPr id="359" name="Google Shape;359;g11b9f8cd8a3_0_64:notes"/>
+          <p:cNvPr id="361" name="Google Shape;361;g11b9f8cd8a3_0_64:notes"/>
           <p:cNvSpPr txBox="1"/>
           <p:nvPr>
             <p:ph idx="1" type="body"/>
@@ -2197,7 +2228,7 @@
   <p:cSld>
     <p:spTree>
       <p:nvGrpSpPr>
-        <p:cNvPr id="374" name="Shape 374"/>
+        <p:cNvPr id="378" name="Shape 378"/>
         <p:cNvGrpSpPr/>
         <p:nvPr/>
       </p:nvGrpSpPr>
@@ -2211,7 +2242,7 @@
       </p:grpSpPr>
       <p:sp>
         <p:nvSpPr>
-          <p:cNvPr id="375" name="Google Shape;375;g110cd4518f6_0_0:notes"/>
+          <p:cNvPr id="379" name="Google Shape;379;g110cd4518f6_0_0:notes"/>
           <p:cNvSpPr/>
           <p:nvPr>
             <p:ph idx="2" type="sldImg"/>
@@ -2246,7 +2277,7 @@
       </p:sp>
       <p:sp>
         <p:nvSpPr>
-          <p:cNvPr id="376" name="Google Shape;376;g110cd4518f6_0_0:notes"/>
+          <p:cNvPr id="380" name="Google Shape;380;g110cd4518f6_0_0:notes"/>
           <p:cNvSpPr txBox="1"/>
           <p:nvPr>
             <p:ph idx="1" type="body"/>
@@ -2494,7 +2525,7 @@
   <p:cSld>
     <p:spTree>
       <p:nvGrpSpPr>
-        <p:cNvPr id="207" name="Shape 207"/>
+        <p:cNvPr id="209" name="Shape 209"/>
         <p:cNvGrpSpPr/>
         <p:nvPr/>
       </p:nvGrpSpPr>
@@ -2508,7 +2539,7 @@
       </p:grpSpPr>
       <p:sp>
         <p:nvSpPr>
-          <p:cNvPr id="208" name="Google Shape;208;g1113c07b4bc_0_112:notes"/>
+          <p:cNvPr id="210" name="Google Shape;210;g1113c07b4bc_0_112:notes"/>
           <p:cNvSpPr/>
           <p:nvPr>
             <p:ph idx="2" type="sldImg"/>
@@ -2543,7 +2574,7 @@
       </p:sp>
       <p:sp>
         <p:nvSpPr>
-          <p:cNvPr id="209" name="Google Shape;209;g1113c07b4bc_0_112:notes"/>
+          <p:cNvPr id="211" name="Google Shape;211;g1113c07b4bc_0_112:notes"/>
           <p:cNvSpPr txBox="1"/>
           <p:nvPr>
             <p:ph idx="1" type="body"/>
@@ -2593,7 +2624,7 @@
   <p:cSld>
     <p:spTree>
       <p:nvGrpSpPr>
-        <p:cNvPr id="215" name="Shape 215"/>
+        <p:cNvPr id="217" name="Shape 217"/>
         <p:cNvGrpSpPr/>
         <p:nvPr/>
       </p:nvGrpSpPr>
@@ -2607,7 +2638,7 @@
       </p:grpSpPr>
       <p:sp>
         <p:nvSpPr>
-          <p:cNvPr id="216" name="Google Shape;216;g111984a9035_0_12:notes"/>
+          <p:cNvPr id="218" name="Google Shape;218;g111984a9035_0_12:notes"/>
           <p:cNvSpPr/>
           <p:nvPr>
             <p:ph idx="2" type="sldImg"/>
@@ -2642,7 +2673,7 @@
       </p:sp>
       <p:sp>
         <p:nvSpPr>
-          <p:cNvPr id="217" name="Google Shape;217;g111984a9035_0_12:notes"/>
+          <p:cNvPr id="219" name="Google Shape;219;g111984a9035_0_12:notes"/>
           <p:cNvSpPr txBox="1"/>
           <p:nvPr>
             <p:ph idx="1" type="body"/>
@@ -2692,7 +2723,7 @@
   <p:cSld>
     <p:spTree>
       <p:nvGrpSpPr>
-        <p:cNvPr id="223" name="Shape 223"/>
+        <p:cNvPr id="225" name="Shape 225"/>
         <p:cNvGrpSpPr/>
         <p:nvPr/>
       </p:nvGrpSpPr>
@@ -2706,7 +2737,7 @@
       </p:grpSpPr>
       <p:sp>
         <p:nvSpPr>
-          <p:cNvPr id="224" name="Google Shape;224;g111b5833a4e_0_13:notes"/>
+          <p:cNvPr id="226" name="Google Shape;226;g111b5833a4e_0_13:notes"/>
           <p:cNvSpPr/>
           <p:nvPr>
             <p:ph idx="2" type="sldImg"/>
@@ -2741,7 +2772,7 @@
       </p:sp>
       <p:sp>
         <p:nvSpPr>
-          <p:cNvPr id="225" name="Google Shape;225;g111b5833a4e_0_13:notes"/>
+          <p:cNvPr id="227" name="Google Shape;227;g111b5833a4e_0_13:notes"/>
           <p:cNvSpPr txBox="1"/>
           <p:nvPr>
             <p:ph idx="1" type="body"/>
@@ -2791,7 +2822,7 @@
   <p:cSld>
     <p:spTree>
       <p:nvGrpSpPr>
-        <p:cNvPr id="231" name="Shape 231"/>
+        <p:cNvPr id="233" name="Shape 233"/>
         <p:cNvGrpSpPr/>
         <p:nvPr/>
       </p:nvGrpSpPr>
@@ -2805,7 +2836,7 @@
       </p:grpSpPr>
       <p:sp>
         <p:nvSpPr>
-          <p:cNvPr id="232" name="Google Shape;232;g111b5833a4e_0_5:notes"/>
+          <p:cNvPr id="234" name="Google Shape;234;g111b5833a4e_0_5:notes"/>
           <p:cNvSpPr/>
           <p:nvPr>
             <p:ph idx="2" type="sldImg"/>
@@ -2840,7 +2871,7 @@
       </p:sp>
       <p:sp>
         <p:nvSpPr>
-          <p:cNvPr id="233" name="Google Shape;233;g111b5833a4e_0_5:notes"/>
+          <p:cNvPr id="235" name="Google Shape;235;g111b5833a4e_0_5:notes"/>
           <p:cNvSpPr txBox="1"/>
           <p:nvPr>
             <p:ph idx="1" type="body"/>
@@ -2890,7 +2921,7 @@
   <p:cSld>
     <p:spTree>
       <p:nvGrpSpPr>
-        <p:cNvPr id="244" name="Shape 244"/>
+        <p:cNvPr id="246" name="Shape 246"/>
         <p:cNvGrpSpPr/>
         <p:nvPr/>
       </p:nvGrpSpPr>
@@ -2904,7 +2935,7 @@
       </p:grpSpPr>
       <p:sp>
         <p:nvSpPr>
-          <p:cNvPr id="245" name="Google Shape;245;g111984a9035_0_23:notes"/>
+          <p:cNvPr id="247" name="Google Shape;247;g111984a9035_0_23:notes"/>
           <p:cNvSpPr/>
           <p:nvPr>
             <p:ph idx="2" type="sldImg"/>
@@ -2939,7 +2970,7 @@
       </p:sp>
       <p:sp>
         <p:nvSpPr>
-          <p:cNvPr id="246" name="Google Shape;246;g111984a9035_0_23:notes"/>
+          <p:cNvPr id="248" name="Google Shape;248;g111984a9035_0_23:notes"/>
           <p:cNvSpPr txBox="1"/>
           <p:nvPr>
             <p:ph idx="1" type="body"/>
@@ -19339,7 +19370,7 @@
   <p:cSld>
     <p:spTree>
       <p:nvGrpSpPr>
-        <p:cNvPr id="257" name="Shape 257"/>
+        <p:cNvPr id="259" name="Shape 259"/>
         <p:cNvGrpSpPr/>
         <p:nvPr/>
       </p:nvGrpSpPr>
@@ -19353,7 +19384,7 @@
       </p:grpSpPr>
       <p:pic>
         <p:nvPicPr>
-          <p:cNvPr id="258" name="Google Shape;258;p46"/>
+          <p:cNvPr id="260" name="Google Shape;260;p46"/>
           <p:cNvPicPr preferRelativeResize="0"/>
           <p:nvPr/>
         </p:nvPicPr>
@@ -19381,7 +19412,7 @@
       </p:pic>
       <p:sp>
         <p:nvSpPr>
-          <p:cNvPr id="259" name="Google Shape;259;p46"/>
+          <p:cNvPr id="261" name="Google Shape;261;p46"/>
           <p:cNvSpPr txBox="1"/>
           <p:nvPr>
             <p:ph type="title"/>
@@ -19402,7 +19433,7 @@
           </a:bodyPr>
           <a:lstStyle/>
           <a:p>
-            <a:pPr indent="0" lvl="0" marL="0" rtl="0" algn="l">
+            <a:pPr indent="0" lvl="0" marL="0" rtl="0" algn="ctr">
               <a:spcBef>
                 <a:spcPts val="0"/>
               </a:spcBef>
@@ -19429,7 +19460,7 @@
       </p:sp>
       <p:sp>
         <p:nvSpPr>
-          <p:cNvPr id="260" name="Google Shape;260;p46"/>
+          <p:cNvPr id="262" name="Google Shape;262;p46"/>
           <p:cNvSpPr txBox="1"/>
           <p:nvPr/>
         </p:nvSpPr>
@@ -19543,7 +19574,7 @@
       </p:sp>
       <p:sp>
         <p:nvSpPr>
-          <p:cNvPr id="261" name="Google Shape;261;p46"/>
+          <p:cNvPr id="263" name="Google Shape;263;p46"/>
           <p:cNvSpPr txBox="1"/>
           <p:nvPr>
             <p:ph idx="12" type="sldNum"/>
@@ -19591,7 +19622,7 @@
       </p:sp>
       <p:pic>
         <p:nvPicPr>
-          <p:cNvPr id="262" name="Google Shape;262;p46"/>
+          <p:cNvPr id="264" name="Google Shape;264;p46"/>
           <p:cNvPicPr preferRelativeResize="0"/>
           <p:nvPr/>
         </p:nvPicPr>
@@ -19619,14 +19650,14 @@
       </p:pic>
       <p:sp>
         <p:nvSpPr>
-          <p:cNvPr id="263" name="Google Shape;263;p46"/>
+          <p:cNvPr id="265" name="Google Shape;265;p46"/>
           <p:cNvSpPr txBox="1"/>
           <p:nvPr/>
         </p:nvSpPr>
         <p:spPr>
           <a:xfrm>
-            <a:off x="2018750" y="3512350"/>
-            <a:ext cx="690000" cy="400200"/>
+            <a:off x="1233100" y="3512350"/>
+            <a:ext cx="1475700" cy="400200"/>
           </a:xfrm>
           <a:prstGeom prst="rect">
             <a:avLst/>
@@ -19658,7 +19689,7 @@
                 <a:cs typeface="Roboto"/>
                 <a:sym typeface="Roboto"/>
               </a:rPr>
-              <a:t>(IBM)</a:t>
+              <a:t>(source: IBM)</a:t>
             </a:r>
             <a:endParaRPr>
               <a:latin typeface="Roboto"/>
@@ -19682,7 +19713,7 @@
   <p:cSld>
     <p:spTree>
       <p:nvGrpSpPr>
-        <p:cNvPr id="267" name="Shape 267"/>
+        <p:cNvPr id="269" name="Shape 269"/>
         <p:cNvGrpSpPr/>
         <p:nvPr/>
       </p:nvGrpSpPr>
@@ -19696,7 +19727,7 @@
       </p:grpSpPr>
       <p:pic>
         <p:nvPicPr>
-          <p:cNvPr id="268" name="Google Shape;268;p47"/>
+          <p:cNvPr id="270" name="Google Shape;270;p47"/>
           <p:cNvPicPr preferRelativeResize="0"/>
           <p:nvPr/>
         </p:nvPicPr>
@@ -19724,7 +19755,7 @@
       </p:pic>
       <p:sp>
         <p:nvSpPr>
-          <p:cNvPr id="269" name="Google Shape;269;p47"/>
+          <p:cNvPr id="271" name="Google Shape;271;p47"/>
           <p:cNvSpPr txBox="1"/>
           <p:nvPr>
             <p:ph type="title"/>
@@ -19745,7 +19776,7 @@
           </a:bodyPr>
           <a:lstStyle/>
           <a:p>
-            <a:pPr indent="0" lvl="0" marL="0" rtl="0" algn="l">
+            <a:pPr indent="0" lvl="0" marL="0" rtl="0" algn="ctr">
               <a:spcBef>
                 <a:spcPts val="0"/>
               </a:spcBef>
@@ -19772,7 +19803,7 @@
       </p:sp>
       <p:sp>
         <p:nvSpPr>
-          <p:cNvPr id="270" name="Google Shape;270;p47"/>
+          <p:cNvPr id="272" name="Google Shape;272;p47"/>
           <p:cNvSpPr txBox="1"/>
           <p:nvPr/>
         </p:nvSpPr>
@@ -19898,7 +19929,7 @@
       </p:sp>
       <p:sp>
         <p:nvSpPr>
-          <p:cNvPr id="271" name="Google Shape;271;p47"/>
+          <p:cNvPr id="273" name="Google Shape;273;p47"/>
           <p:cNvSpPr txBox="1"/>
           <p:nvPr>
             <p:ph idx="12" type="sldNum"/>
@@ -19946,7 +19977,7 @@
       </p:sp>
       <p:pic>
         <p:nvPicPr>
-          <p:cNvPr id="272" name="Google Shape;272;p47"/>
+          <p:cNvPr id="274" name="Google Shape;274;p47"/>
           <p:cNvPicPr preferRelativeResize="0"/>
           <p:nvPr/>
         </p:nvPicPr>
@@ -19974,14 +20005,14 @@
       </p:pic>
       <p:sp>
         <p:nvSpPr>
-          <p:cNvPr id="273" name="Google Shape;273;p47"/>
+          <p:cNvPr id="275" name="Google Shape;275;p47"/>
           <p:cNvSpPr txBox="1"/>
           <p:nvPr/>
         </p:nvSpPr>
         <p:spPr>
           <a:xfrm>
             <a:off x="1023925" y="4123275"/>
-            <a:ext cx="2095500" cy="400200"/>
+            <a:ext cx="2719800" cy="400200"/>
           </a:xfrm>
           <a:prstGeom prst="rect">
             <a:avLst/>
@@ -20013,7 +20044,7 @@
                 <a:cs typeface="Roboto"/>
                 <a:sym typeface="Roboto"/>
               </a:rPr>
-              <a:t>(Sarkar et al. 2018)</a:t>
+              <a:t>(source: Sarkar et al. 2018)</a:t>
             </a:r>
             <a:endParaRPr>
               <a:latin typeface="Roboto"/>
@@ -20026,7 +20057,7 @@
       </p:sp>
       <p:pic>
         <p:nvPicPr>
-          <p:cNvPr id="274" name="Google Shape;274;p47"/>
+          <p:cNvPr id="276" name="Google Shape;276;p47"/>
           <p:cNvPicPr preferRelativeResize="0"/>
           <p:nvPr/>
         </p:nvPicPr>
@@ -20065,7 +20096,7 @@
   <p:cSld>
     <p:spTree>
       <p:nvGrpSpPr>
-        <p:cNvPr id="278" name="Shape 278"/>
+        <p:cNvPr id="280" name="Shape 280"/>
         <p:cNvGrpSpPr/>
         <p:nvPr/>
       </p:nvGrpSpPr>
@@ -20079,7 +20110,7 @@
       </p:grpSpPr>
       <p:pic>
         <p:nvPicPr>
-          <p:cNvPr id="279" name="Google Shape;279;p48"/>
+          <p:cNvPr id="281" name="Google Shape;281;p48"/>
           <p:cNvPicPr preferRelativeResize="0"/>
           <p:nvPr/>
         </p:nvPicPr>
@@ -20107,7 +20138,7 @@
       </p:pic>
       <p:sp>
         <p:nvSpPr>
-          <p:cNvPr id="280" name="Google Shape;280;p48"/>
+          <p:cNvPr id="282" name="Google Shape;282;p48"/>
           <p:cNvSpPr txBox="1"/>
           <p:nvPr>
             <p:ph type="title"/>
@@ -20128,7 +20159,7 @@
           </a:bodyPr>
           <a:lstStyle/>
           <a:p>
-            <a:pPr indent="0" lvl="0" marL="0" rtl="0" algn="l">
+            <a:pPr indent="0" lvl="0" marL="0" rtl="0" algn="ctr">
               <a:spcBef>
                 <a:spcPts val="0"/>
               </a:spcBef>
@@ -20155,14 +20186,14 @@
       </p:sp>
       <p:sp>
         <p:nvSpPr>
-          <p:cNvPr id="281" name="Google Shape;281;p48"/>
+          <p:cNvPr id="283" name="Google Shape;283;p48"/>
           <p:cNvSpPr txBox="1"/>
           <p:nvPr/>
         </p:nvSpPr>
         <p:spPr>
           <a:xfrm>
             <a:off x="548700" y="766750"/>
-            <a:ext cx="8401200" cy="1736100"/>
+            <a:ext cx="8401200" cy="1992900"/>
           </a:xfrm>
           <a:prstGeom prst="rect">
             <a:avLst/>
@@ -20203,7 +20234,7 @@
                 <a:spcPct val="115000"/>
               </a:lnSpc>
               <a:spcBef>
-                <a:spcPts val="0"/>
+                <a:spcPts val="1000"/>
               </a:spcBef>
               <a:spcAft>
                 <a:spcPts val="0"/>
@@ -20223,10 +20254,10 @@
                 <a:spcPct val="115000"/>
               </a:lnSpc>
               <a:spcBef>
-                <a:spcPts val="0"/>
-              </a:spcBef>
-              <a:spcAft>
-                <a:spcPts val="0"/>
+                <a:spcPts val="1000"/>
+              </a:spcBef>
+              <a:spcAft>
+                <a:spcPts val="1000"/>
               </a:spcAft>
               <a:buSzPts val="1800"/>
               <a:buChar char="●"/>
@@ -20241,7 +20272,7 @@
       </p:sp>
       <p:sp>
         <p:nvSpPr>
-          <p:cNvPr id="282" name="Google Shape;282;p48"/>
+          <p:cNvPr id="284" name="Google Shape;284;p48"/>
           <p:cNvSpPr txBox="1"/>
           <p:nvPr>
             <p:ph idx="12" type="sldNum"/>
@@ -20289,22 +20320,21 @@
       </p:sp>
       <p:pic>
         <p:nvPicPr>
-          <p:cNvPr id="283" name="Google Shape;283;p48"/>
+          <p:cNvPr id="285" name="Google Shape;285;p48"/>
           <p:cNvPicPr preferRelativeResize="0"/>
           <p:nvPr/>
         </p:nvPicPr>
-        <p:blipFill>
+        <p:blipFill rotWithShape="1">
           <a:blip r:embed="rId4">
             <a:alphaModFix/>
           </a:blip>
-          <a:stretch>
-            <a:fillRect/>
-          </a:stretch>
+          <a:srcRect b="7663" l="0" r="0" t="0"/>
+          <a:stretch/>
         </p:blipFill>
         <p:spPr>
           <a:xfrm>
-            <a:off x="1673538" y="2551952"/>
-            <a:ext cx="3883162" cy="2158350"/>
+            <a:off x="1731375" y="2701875"/>
+            <a:ext cx="3883150" cy="1992900"/>
           </a:xfrm>
           <a:prstGeom prst="rect">
             <a:avLst/>
@@ -20317,14 +20347,14 @@
       </p:pic>
       <p:sp>
         <p:nvSpPr>
-          <p:cNvPr id="284" name="Google Shape;284;p48"/>
+          <p:cNvPr id="286" name="Google Shape;286;p48"/>
           <p:cNvSpPr txBox="1"/>
           <p:nvPr/>
         </p:nvSpPr>
         <p:spPr>
           <a:xfrm>
-            <a:off x="5614513" y="3986025"/>
-            <a:ext cx="1989300" cy="400200"/>
+            <a:off x="5614529" y="3986025"/>
+            <a:ext cx="2595000" cy="400200"/>
           </a:xfrm>
           <a:prstGeom prst="rect">
             <a:avLst/>
@@ -20356,7 +20386,7 @@
                 <a:cs typeface="Roboto"/>
                 <a:sym typeface="Roboto"/>
               </a:rPr>
-              <a:t>(Greener et al. 2022)</a:t>
+              <a:t>(source: Greener et al. 2022)</a:t>
             </a:r>
             <a:endParaRPr>
               <a:latin typeface="Roboto"/>
@@ -20380,7 +20410,7 @@
   <p:cSld>
     <p:spTree>
       <p:nvGrpSpPr>
-        <p:cNvPr id="288" name="Shape 288"/>
+        <p:cNvPr id="290" name="Shape 290"/>
         <p:cNvGrpSpPr/>
         <p:nvPr/>
       </p:nvGrpSpPr>
@@ -20394,7 +20424,7 @@
       </p:grpSpPr>
       <p:pic>
         <p:nvPicPr>
-          <p:cNvPr id="289" name="Google Shape;289;p49"/>
+          <p:cNvPr id="291" name="Google Shape;291;p49"/>
           <p:cNvPicPr preferRelativeResize="0"/>
           <p:nvPr/>
         </p:nvPicPr>
@@ -20422,7 +20452,7 @@
       </p:pic>
       <p:sp>
         <p:nvSpPr>
-          <p:cNvPr id="290" name="Google Shape;290;p49"/>
+          <p:cNvPr id="292" name="Google Shape;292;p49"/>
           <p:cNvSpPr txBox="1"/>
           <p:nvPr>
             <p:ph type="title"/>
@@ -20443,7 +20473,7 @@
           </a:bodyPr>
           <a:lstStyle/>
           <a:p>
-            <a:pPr indent="0" lvl="0" marL="0" rtl="0" algn="l">
+            <a:pPr indent="0" lvl="0" marL="0" rtl="0" algn="ctr">
               <a:spcBef>
                 <a:spcPts val="0"/>
               </a:spcBef>
@@ -20470,7 +20500,7 @@
       </p:sp>
       <p:sp>
         <p:nvSpPr>
-          <p:cNvPr id="291" name="Google Shape;291;p49"/>
+          <p:cNvPr id="293" name="Google Shape;293;p49"/>
           <p:cNvSpPr txBox="1"/>
           <p:nvPr/>
         </p:nvSpPr>
@@ -20532,7 +20562,7 @@
             </a:pPr>
             <a:r>
               <a:rPr lang="en" sz="1600"/>
-              <a:t>We have a single point only in our validation set and the rest n-1 observations become the training set. Mostly suitable for small datasets.</a:t>
+              <a:t>We have a single data point only in our validation set and the rest n-1 observations become the training set. Mostly suitable for small datasets.</a:t>
             </a:r>
             <a:endParaRPr sz="1600"/>
           </a:p>
@@ -20540,7 +20570,7 @@
       </p:sp>
       <p:sp>
         <p:nvSpPr>
-          <p:cNvPr id="292" name="Google Shape;292;p49"/>
+          <p:cNvPr id="294" name="Google Shape;294;p49"/>
           <p:cNvSpPr txBox="1"/>
           <p:nvPr>
             <p:ph idx="12" type="sldNum"/>
@@ -20588,7 +20618,7 @@
       </p:sp>
       <p:sp>
         <p:nvSpPr>
-          <p:cNvPr id="293" name="Google Shape;293;p49"/>
+          <p:cNvPr id="295" name="Google Shape;295;p49"/>
           <p:cNvSpPr txBox="1"/>
           <p:nvPr/>
         </p:nvSpPr>
@@ -20718,7 +20748,7 @@
       </p:sp>
       <p:pic>
         <p:nvPicPr>
-          <p:cNvPr id="294" name="Google Shape;294;p49"/>
+          <p:cNvPr id="296" name="Google Shape;296;p49"/>
           <p:cNvPicPr preferRelativeResize="0"/>
           <p:nvPr/>
         </p:nvPicPr>
@@ -20732,7 +20762,7 @@
         </p:blipFill>
         <p:spPr>
           <a:xfrm>
-            <a:off x="122775" y="1834200"/>
+            <a:off x="203500" y="2144562"/>
             <a:ext cx="3878574" cy="1736125"/>
           </a:xfrm>
           <a:prstGeom prst="rect">
@@ -20746,14 +20776,14 @@
       </p:pic>
       <p:sp>
         <p:nvSpPr>
-          <p:cNvPr id="295" name="Google Shape;295;p49"/>
+          <p:cNvPr id="297" name="Google Shape;297;p49"/>
           <p:cNvSpPr txBox="1"/>
           <p:nvPr/>
         </p:nvSpPr>
         <p:spPr>
           <a:xfrm>
-            <a:off x="820713" y="3629850"/>
-            <a:ext cx="1233000" cy="400200"/>
+            <a:off x="901459" y="3940213"/>
+            <a:ext cx="2145300" cy="400200"/>
           </a:xfrm>
           <a:prstGeom prst="rect">
             <a:avLst/>
@@ -20785,7 +20815,7 @@
                 <a:cs typeface="Roboto"/>
                 <a:sym typeface="Roboto"/>
               </a:rPr>
-              <a:t>(Patro, 2021)</a:t>
+              <a:t>(source: Patro, 2021)</a:t>
             </a:r>
             <a:endParaRPr>
               <a:latin typeface="Roboto"/>
@@ -20809,7 +20839,7 @@
   <p:cSld>
     <p:spTree>
       <p:nvGrpSpPr>
-        <p:cNvPr id="299" name="Shape 299"/>
+        <p:cNvPr id="301" name="Shape 301"/>
         <p:cNvGrpSpPr/>
         <p:nvPr/>
       </p:nvGrpSpPr>
@@ -20823,7 +20853,7 @@
       </p:grpSpPr>
       <p:pic>
         <p:nvPicPr>
-          <p:cNvPr id="300" name="Google Shape;300;p50"/>
+          <p:cNvPr id="302" name="Google Shape;302;p50"/>
           <p:cNvPicPr preferRelativeResize="0"/>
           <p:nvPr/>
         </p:nvPicPr>
@@ -20851,7 +20881,7 @@
       </p:pic>
       <p:sp>
         <p:nvSpPr>
-          <p:cNvPr id="301" name="Google Shape;301;p50"/>
+          <p:cNvPr id="303" name="Google Shape;303;p50"/>
           <p:cNvSpPr txBox="1"/>
           <p:nvPr>
             <p:ph type="title"/>
@@ -20872,7 +20902,7 @@
           </a:bodyPr>
           <a:lstStyle/>
           <a:p>
-            <a:pPr indent="0" lvl="0" marL="0" rtl="0" algn="l">
+            <a:pPr indent="0" lvl="0" marL="0" rtl="0" algn="ctr">
               <a:spcBef>
                 <a:spcPts val="0"/>
               </a:spcBef>
@@ -20899,7 +20929,7 @@
       </p:sp>
       <p:sp>
         <p:nvSpPr>
-          <p:cNvPr id="302" name="Google Shape;302;p50"/>
+          <p:cNvPr id="304" name="Google Shape;304;p50"/>
           <p:cNvSpPr txBox="1"/>
           <p:nvPr/>
         </p:nvSpPr>
@@ -21097,7 +21127,7 @@
       </p:sp>
       <p:sp>
         <p:nvSpPr>
-          <p:cNvPr id="303" name="Google Shape;303;p50"/>
+          <p:cNvPr id="305" name="Google Shape;305;p50"/>
           <p:cNvSpPr txBox="1"/>
           <p:nvPr>
             <p:ph idx="12" type="sldNum"/>
@@ -21156,7 +21186,7 @@
   <p:cSld>
     <p:spTree>
       <p:nvGrpSpPr>
-        <p:cNvPr id="307" name="Shape 307"/>
+        <p:cNvPr id="309" name="Shape 309"/>
         <p:cNvGrpSpPr/>
         <p:nvPr/>
       </p:nvGrpSpPr>
@@ -21170,7 +21200,7 @@
       </p:grpSpPr>
       <p:pic>
         <p:nvPicPr>
-          <p:cNvPr id="308" name="Google Shape;308;p51"/>
+          <p:cNvPr id="310" name="Google Shape;310;p51"/>
           <p:cNvPicPr preferRelativeResize="0"/>
           <p:nvPr/>
         </p:nvPicPr>
@@ -21197,7 +21227,7 @@
       </p:pic>
       <p:sp>
         <p:nvSpPr>
-          <p:cNvPr id="309" name="Google Shape;309;p51"/>
+          <p:cNvPr id="311" name="Google Shape;311;p51"/>
           <p:cNvSpPr txBox="1"/>
           <p:nvPr>
             <p:ph type="title"/>
@@ -21245,7 +21275,7 @@
       </p:sp>
       <p:sp>
         <p:nvSpPr>
-          <p:cNvPr id="310" name="Google Shape;310;p51"/>
+          <p:cNvPr id="312" name="Google Shape;312;p51"/>
           <p:cNvSpPr txBox="1"/>
           <p:nvPr/>
         </p:nvSpPr>
@@ -21409,7 +21439,7 @@
       </p:sp>
       <p:sp>
         <p:nvSpPr>
-          <p:cNvPr id="311" name="Google Shape;311;p51"/>
+          <p:cNvPr id="313" name="Google Shape;313;p51"/>
           <p:cNvSpPr txBox="1"/>
           <p:nvPr>
             <p:ph idx="12" type="sldNum"/>
@@ -21457,7 +21487,7 @@
       </p:sp>
       <p:pic>
         <p:nvPicPr>
-          <p:cNvPr id="312" name="Google Shape;312;p51"/>
+          <p:cNvPr id="314" name="Google Shape;314;p51"/>
           <p:cNvPicPr preferRelativeResize="0"/>
           <p:nvPr/>
         </p:nvPicPr>
@@ -21495,7 +21525,7 @@
   <p:cSld>
     <p:spTree>
       <p:nvGrpSpPr>
-        <p:cNvPr id="316" name="Shape 316"/>
+        <p:cNvPr id="318" name="Shape 318"/>
         <p:cNvGrpSpPr/>
         <p:nvPr/>
       </p:nvGrpSpPr>
@@ -21509,7 +21539,7 @@
       </p:grpSpPr>
       <p:pic>
         <p:nvPicPr>
-          <p:cNvPr id="317" name="Google Shape;317;p52"/>
+          <p:cNvPr id="319" name="Google Shape;319;p52"/>
           <p:cNvPicPr preferRelativeResize="0"/>
           <p:nvPr/>
         </p:nvPicPr>
@@ -21537,7 +21567,7 @@
       </p:pic>
       <p:sp>
         <p:nvSpPr>
-          <p:cNvPr id="318" name="Google Shape;318;p52"/>
+          <p:cNvPr id="320" name="Google Shape;320;p52"/>
           <p:cNvSpPr txBox="1"/>
           <p:nvPr>
             <p:ph type="title"/>
@@ -21558,7 +21588,7 @@
           </a:bodyPr>
           <a:lstStyle/>
           <a:p>
-            <a:pPr indent="0" lvl="0" marL="0" rtl="0" algn="l">
+            <a:pPr indent="0" lvl="0" marL="0" rtl="0" algn="ctr">
               <a:spcBef>
                 <a:spcPts val="0"/>
               </a:spcBef>
@@ -21585,14 +21615,14 @@
       </p:sp>
       <p:sp>
         <p:nvSpPr>
-          <p:cNvPr id="319" name="Google Shape;319;p52"/>
+          <p:cNvPr id="321" name="Google Shape;321;p52"/>
           <p:cNvSpPr txBox="1"/>
           <p:nvPr/>
         </p:nvSpPr>
         <p:spPr>
           <a:xfrm>
             <a:off x="311700" y="717650"/>
-            <a:ext cx="8697300" cy="2979900"/>
+            <a:ext cx="8697300" cy="3209700"/>
           </a:xfrm>
           <a:prstGeom prst="rect">
             <a:avLst/>
@@ -21633,7 +21663,7 @@
                 <a:spcPct val="115000"/>
               </a:lnSpc>
               <a:spcBef>
-                <a:spcPts val="0"/>
+                <a:spcPts val="1000"/>
               </a:spcBef>
               <a:spcAft>
                 <a:spcPts val="0"/>
@@ -21653,7 +21683,7 @@
                 <a:spcPct val="115000"/>
               </a:lnSpc>
               <a:spcBef>
-                <a:spcPts val="0"/>
+                <a:spcPts val="1000"/>
               </a:spcBef>
               <a:spcAft>
                 <a:spcPts val="0"/>
@@ -21663,7 +21693,7 @@
             </a:pPr>
             <a:r>
               <a:rPr lang="en" sz="1600"/>
-              <a:t>Other simple black box models such as simple decision tree could be made interpretable by using the feature importance as an output.</a:t>
+              <a:t>Many ML models are black box and hard to interpret.</a:t>
             </a:r>
             <a:endParaRPr sz="1600"/>
           </a:p>
@@ -21673,7 +21703,7 @@
                 <a:spcPct val="115000"/>
               </a:lnSpc>
               <a:spcBef>
-                <a:spcPts val="0"/>
+                <a:spcPts val="1000"/>
               </a:spcBef>
               <a:spcAft>
                 <a:spcPts val="0"/>
@@ -21693,10 +21723,10 @@
                 <a:spcPct val="115000"/>
               </a:lnSpc>
               <a:spcBef>
-                <a:spcPts val="0"/>
-              </a:spcBef>
-              <a:spcAft>
-                <a:spcPts val="0"/>
+                <a:spcPts val="1000"/>
+              </a:spcBef>
+              <a:spcAft>
+                <a:spcPts val="1000"/>
               </a:spcAft>
               <a:buSzPts val="1600"/>
               <a:buChar char="●"/>
@@ -21711,7 +21741,7 @@
       </p:sp>
       <p:sp>
         <p:nvSpPr>
-          <p:cNvPr id="320" name="Google Shape;320;p52"/>
+          <p:cNvPr id="322" name="Google Shape;322;p52"/>
           <p:cNvSpPr txBox="1"/>
           <p:nvPr>
             <p:ph idx="12" type="sldNum"/>
@@ -21759,7 +21789,7 @@
       </p:sp>
       <p:sp>
         <p:nvSpPr>
-          <p:cNvPr id="321" name="Google Shape;321;p52"/>
+          <p:cNvPr id="323" name="Google Shape;323;p52"/>
           <p:cNvSpPr txBox="1"/>
           <p:nvPr/>
         </p:nvSpPr>
@@ -21819,7 +21849,7 @@
   <p:cSld>
     <p:spTree>
       <p:nvGrpSpPr>
-        <p:cNvPr id="325" name="Shape 325"/>
+        <p:cNvPr id="327" name="Shape 327"/>
         <p:cNvGrpSpPr/>
         <p:nvPr/>
       </p:nvGrpSpPr>
@@ -21833,7 +21863,7 @@
       </p:grpSpPr>
       <p:pic>
         <p:nvPicPr>
-          <p:cNvPr id="326" name="Google Shape;326;p53"/>
+          <p:cNvPr id="328" name="Google Shape;328;p53"/>
           <p:cNvPicPr preferRelativeResize="0"/>
           <p:nvPr/>
         </p:nvPicPr>
@@ -21861,7 +21891,7 @@
       </p:pic>
       <p:sp>
         <p:nvSpPr>
-          <p:cNvPr id="327" name="Google Shape;327;p53"/>
+          <p:cNvPr id="329" name="Google Shape;329;p53"/>
           <p:cNvSpPr txBox="1"/>
           <p:nvPr>
             <p:ph type="title"/>
@@ -21882,7 +21912,7 @@
           </a:bodyPr>
           <a:lstStyle/>
           <a:p>
-            <a:pPr indent="0" lvl="0" marL="0" rtl="0" algn="l">
+            <a:pPr indent="0" lvl="0" marL="0" rtl="0" algn="ctr">
               <a:spcBef>
                 <a:spcPts val="0"/>
               </a:spcBef>
@@ -21909,14 +21939,14 @@
       </p:sp>
       <p:sp>
         <p:nvSpPr>
-          <p:cNvPr id="328" name="Google Shape;328;p53"/>
+          <p:cNvPr id="330" name="Google Shape;330;p53"/>
           <p:cNvSpPr txBox="1"/>
           <p:nvPr/>
         </p:nvSpPr>
         <p:spPr>
           <a:xfrm>
-            <a:off x="69300" y="605125"/>
-            <a:ext cx="8763000" cy="1743300"/>
+            <a:off x="69300" y="613850"/>
+            <a:ext cx="8763000" cy="1862400"/>
           </a:xfrm>
           <a:prstGeom prst="rect">
             <a:avLst/>
@@ -21957,7 +21987,7 @@
                 <a:spcPct val="115000"/>
               </a:lnSpc>
               <a:spcBef>
-                <a:spcPts val="0"/>
+                <a:spcPts val="1000"/>
               </a:spcBef>
               <a:spcAft>
                 <a:spcPts val="0"/>
@@ -21967,7 +21997,7 @@
             </a:pPr>
             <a:r>
               <a:rPr lang="en" sz="1500"/>
-              <a:t>The ideas of Skater is to understand black box ML models by querying them and interpreting their learned decision policies.</a:t>
+              <a:t>The idea of Skater is to understand black box ML models by querying them and interpreting their learned decision policies.</a:t>
             </a:r>
             <a:endParaRPr sz="1500"/>
           </a:p>
@@ -21977,7 +22007,7 @@
                 <a:spcPct val="115000"/>
               </a:lnSpc>
               <a:spcBef>
-                <a:spcPts val="0"/>
+                <a:spcPts val="1000"/>
               </a:spcBef>
               <a:spcAft>
                 <a:spcPts val="0"/>
@@ -21987,7 +22017,25 @@
             </a:pPr>
             <a:r>
               <a:rPr lang="en" sz="1500"/>
-              <a:t>The philosophy of Skater is that all models should be evaluated as black boxes and decision criteria of the models are inferred and interpreted based on input perturbations and observing the corresponding output predictions.</a:t>
+              <a:t>Skater enables us to do both global and local interpretations.</a:t>
+            </a:r>
+            <a:endParaRPr sz="1500"/>
+          </a:p>
+          <a:p>
+            <a:pPr indent="0" lvl="0" marL="457200" rtl="0" algn="l">
+              <a:lnSpc>
+                <a:spcPct val="115000"/>
+              </a:lnSpc>
+              <a:spcBef>
+                <a:spcPts val="1000"/>
+              </a:spcBef>
+              <a:spcAft>
+                <a:spcPts val="1000"/>
+              </a:spcAft>
+              <a:buNone/>
+            </a:pPr>
+            <a:r>
+              <a:t/>
             </a:r>
             <a:endParaRPr sz="1500"/>
           </a:p>
@@ -21995,7 +22043,7 @@
       </p:sp>
       <p:sp>
         <p:nvSpPr>
-          <p:cNvPr id="329" name="Google Shape;329;p53"/>
+          <p:cNvPr id="331" name="Google Shape;331;p53"/>
           <p:cNvSpPr txBox="1"/>
           <p:nvPr>
             <p:ph idx="12" type="sldNum"/>
@@ -22043,7 +22091,7 @@
       </p:sp>
       <p:pic>
         <p:nvPicPr>
-          <p:cNvPr id="330" name="Google Shape;330;p53"/>
+          <p:cNvPr id="332" name="Google Shape;332;p53"/>
           <p:cNvPicPr preferRelativeResize="0"/>
           <p:nvPr/>
         </p:nvPicPr>
@@ -22057,8 +22105,8 @@
         </p:blipFill>
         <p:spPr>
           <a:xfrm>
-            <a:off x="2419225" y="2278425"/>
-            <a:ext cx="5174925" cy="2319350"/>
+            <a:off x="2476925" y="2206100"/>
+            <a:ext cx="5325400" cy="2386800"/>
           </a:xfrm>
           <a:prstGeom prst="rect">
             <a:avLst/>
@@ -22071,14 +22119,14 @@
       </p:pic>
       <p:sp>
         <p:nvSpPr>
-          <p:cNvPr id="331" name="Google Shape;331;p53"/>
+          <p:cNvPr id="333" name="Google Shape;333;p53"/>
           <p:cNvSpPr txBox="1"/>
           <p:nvPr/>
         </p:nvSpPr>
         <p:spPr>
           <a:xfrm>
-            <a:off x="2241725" y="4011150"/>
-            <a:ext cx="1473600" cy="369300"/>
+            <a:off x="465700" y="4113150"/>
+            <a:ext cx="2382300" cy="369300"/>
           </a:xfrm>
           <a:prstGeom prst="rect">
             <a:avLst/>
@@ -22110,7 +22158,7 @@
                 <a:cs typeface="Roboto"/>
                 <a:sym typeface="Roboto"/>
               </a:rPr>
-              <a:t>(Sarkar et al. 2018)</a:t>
+              <a:t>(source: Sarkar et al. 2018)</a:t>
             </a:r>
             <a:endParaRPr sz="1200">
               <a:latin typeface="Roboto"/>
@@ -22134,7 +22182,7 @@
   <p:cSld>
     <p:spTree>
       <p:nvGrpSpPr>
-        <p:cNvPr id="335" name="Shape 335"/>
+        <p:cNvPr id="337" name="Shape 337"/>
         <p:cNvGrpSpPr/>
         <p:nvPr/>
       </p:nvGrpSpPr>
@@ -22148,7 +22196,7 @@
       </p:grpSpPr>
       <p:pic>
         <p:nvPicPr>
-          <p:cNvPr id="336" name="Google Shape;336;p54"/>
+          <p:cNvPr id="338" name="Google Shape;338;p54"/>
           <p:cNvPicPr preferRelativeResize="0"/>
           <p:nvPr/>
         </p:nvPicPr>
@@ -22175,7 +22223,7 @@
       </p:pic>
       <p:sp>
         <p:nvSpPr>
-          <p:cNvPr id="337" name="Google Shape;337;p54"/>
+          <p:cNvPr id="339" name="Google Shape;339;p54"/>
           <p:cNvSpPr txBox="1"/>
           <p:nvPr>
             <p:ph type="title"/>
@@ -22223,7 +22271,7 @@
       </p:sp>
       <p:sp>
         <p:nvSpPr>
-          <p:cNvPr id="338" name="Google Shape;338;p54"/>
+          <p:cNvPr id="340" name="Google Shape;340;p54"/>
           <p:cNvSpPr txBox="1"/>
           <p:nvPr/>
         </p:nvSpPr>
@@ -22387,7 +22435,7 @@
       </p:sp>
       <p:sp>
         <p:nvSpPr>
-          <p:cNvPr id="339" name="Google Shape;339;p54"/>
+          <p:cNvPr id="341" name="Google Shape;341;p54"/>
           <p:cNvSpPr txBox="1"/>
           <p:nvPr>
             <p:ph idx="12" type="sldNum"/>
@@ -22435,7 +22483,7 @@
       </p:sp>
       <p:pic>
         <p:nvPicPr>
-          <p:cNvPr id="340" name="Google Shape;340;p54"/>
+          <p:cNvPr id="342" name="Google Shape;342;p54"/>
           <p:cNvPicPr preferRelativeResize="0"/>
           <p:nvPr/>
         </p:nvPicPr>
@@ -22473,7 +22521,7 @@
   <p:cSld>
     <p:spTree>
       <p:nvGrpSpPr>
-        <p:cNvPr id="344" name="Shape 344"/>
+        <p:cNvPr id="346" name="Shape 346"/>
         <p:cNvGrpSpPr/>
         <p:nvPr/>
       </p:nvGrpSpPr>
@@ -22487,7 +22535,7 @@
       </p:grpSpPr>
       <p:pic>
         <p:nvPicPr>
-          <p:cNvPr id="345" name="Google Shape;345;p55"/>
+          <p:cNvPr id="347" name="Google Shape;347;p55"/>
           <p:cNvPicPr preferRelativeResize="0"/>
           <p:nvPr/>
         </p:nvPicPr>
@@ -22515,7 +22563,7 @@
       </p:pic>
       <p:sp>
         <p:nvSpPr>
-          <p:cNvPr id="346" name="Google Shape;346;p55"/>
+          <p:cNvPr id="348" name="Google Shape;348;p55"/>
           <p:cNvSpPr txBox="1"/>
           <p:nvPr>
             <p:ph type="title"/>
@@ -22536,7 +22584,7 @@
           </a:bodyPr>
           <a:lstStyle/>
           <a:p>
-            <a:pPr indent="0" lvl="0" marL="0" rtl="0" algn="l">
+            <a:pPr indent="0" lvl="0" marL="0" rtl="0" algn="ctr">
               <a:spcBef>
                 <a:spcPts val="0"/>
               </a:spcBef>
@@ -22563,14 +22611,14 @@
       </p:sp>
       <p:sp>
         <p:nvSpPr>
-          <p:cNvPr id="347" name="Google Shape;347;p55"/>
+          <p:cNvPr id="349" name="Google Shape;349;p55"/>
           <p:cNvSpPr txBox="1"/>
           <p:nvPr/>
         </p:nvSpPr>
         <p:spPr>
           <a:xfrm>
-            <a:off x="415500" y="906275"/>
-            <a:ext cx="8313000" cy="1650000"/>
+            <a:off x="357850" y="1540550"/>
+            <a:ext cx="8313000" cy="1906500"/>
           </a:xfrm>
           <a:prstGeom prst="rect">
             <a:avLst/>
@@ -22611,7 +22659,7 @@
                 <a:spcPct val="115000"/>
               </a:lnSpc>
               <a:spcBef>
-                <a:spcPts val="0"/>
+                <a:spcPts val="1000"/>
               </a:spcBef>
               <a:spcAft>
                 <a:spcPts val="0"/>
@@ -22631,10 +22679,10 @@
                 <a:spcPct val="115000"/>
               </a:lnSpc>
               <a:spcBef>
-                <a:spcPts val="0"/>
-              </a:spcBef>
-              <a:spcAft>
-                <a:spcPts val="0"/>
+                <a:spcPts val="1000"/>
+              </a:spcBef>
+              <a:spcAft>
+                <a:spcPts val="1000"/>
               </a:spcAft>
               <a:buSzPts val="1700"/>
               <a:buChar char="●"/>
@@ -22649,7 +22697,7 @@
       </p:sp>
       <p:sp>
         <p:nvSpPr>
-          <p:cNvPr id="348" name="Google Shape;348;p55"/>
+          <p:cNvPr id="350" name="Google Shape;350;p55"/>
           <p:cNvSpPr txBox="1"/>
           <p:nvPr>
             <p:ph idx="12" type="sldNum"/>
@@ -22849,7 +22897,7 @@
   <p:cSld>
     <p:spTree>
       <p:nvGrpSpPr>
-        <p:cNvPr id="352" name="Shape 352"/>
+        <p:cNvPr id="354" name="Shape 354"/>
         <p:cNvGrpSpPr/>
         <p:nvPr/>
       </p:nvGrpSpPr>
@@ -22863,7 +22911,7 @@
       </p:grpSpPr>
       <p:pic>
         <p:nvPicPr>
-          <p:cNvPr id="353" name="Google Shape;353;p56"/>
+          <p:cNvPr id="355" name="Google Shape;355;p56"/>
           <p:cNvPicPr preferRelativeResize="0"/>
           <p:nvPr/>
         </p:nvPicPr>
@@ -22891,7 +22939,7 @@
       </p:pic>
       <p:sp>
         <p:nvSpPr>
-          <p:cNvPr id="354" name="Google Shape;354;p56"/>
+          <p:cNvPr id="356" name="Google Shape;356;p56"/>
           <p:cNvSpPr txBox="1"/>
           <p:nvPr>
             <p:ph type="title"/>
@@ -22912,7 +22960,7 @@
           </a:bodyPr>
           <a:lstStyle/>
           <a:p>
-            <a:pPr indent="0" lvl="0" marL="0" rtl="0" algn="l">
+            <a:pPr indent="0" lvl="0" marL="0" rtl="0" algn="ctr">
               <a:spcBef>
                 <a:spcPts val="0"/>
               </a:spcBef>
@@ -22939,14 +22987,14 @@
       </p:sp>
       <p:sp>
         <p:nvSpPr>
-          <p:cNvPr id="355" name="Google Shape;355;p56"/>
+          <p:cNvPr id="357" name="Google Shape;357;p56"/>
           <p:cNvSpPr txBox="1"/>
           <p:nvPr/>
         </p:nvSpPr>
         <p:spPr>
           <a:xfrm>
-            <a:off x="415650" y="837000"/>
-            <a:ext cx="8312700" cy="1650000"/>
+            <a:off x="415650" y="1540475"/>
+            <a:ext cx="8312700" cy="1906500"/>
           </a:xfrm>
           <a:prstGeom prst="rect">
             <a:avLst/>
@@ -22987,7 +23035,7 @@
                 <a:spcPct val="115000"/>
               </a:lnSpc>
               <a:spcBef>
-                <a:spcPts val="0"/>
+                <a:spcPts val="1000"/>
               </a:spcBef>
               <a:spcAft>
                 <a:spcPts val="0"/>
@@ -23007,10 +23055,10 @@
                 <a:spcPct val="115000"/>
               </a:lnSpc>
               <a:spcBef>
-                <a:spcPts val="0"/>
-              </a:spcBef>
-              <a:spcAft>
-                <a:spcPts val="0"/>
+                <a:spcPts val="1000"/>
+              </a:spcBef>
+              <a:spcAft>
+                <a:spcPts val="1000"/>
               </a:spcAft>
               <a:buSzPts val="1700"/>
               <a:buChar char="●"/>
@@ -23025,7 +23073,7 @@
       </p:sp>
       <p:sp>
         <p:nvSpPr>
-          <p:cNvPr id="356" name="Google Shape;356;p56"/>
+          <p:cNvPr id="358" name="Google Shape;358;p56"/>
           <p:cNvSpPr txBox="1"/>
           <p:nvPr>
             <p:ph idx="12" type="sldNum"/>
@@ -23084,7 +23132,7 @@
   <p:cSld>
     <p:spTree>
       <p:nvGrpSpPr>
-        <p:cNvPr id="360" name="Shape 360"/>
+        <p:cNvPr id="362" name="Shape 362"/>
         <p:cNvGrpSpPr/>
         <p:nvPr/>
       </p:nvGrpSpPr>
@@ -23098,7 +23146,7 @@
       </p:grpSpPr>
       <p:pic>
         <p:nvPicPr>
-          <p:cNvPr id="361" name="Google Shape;361;p57"/>
+          <p:cNvPr id="363" name="Google Shape;363;p57"/>
           <p:cNvPicPr preferRelativeResize="0"/>
           <p:nvPr/>
         </p:nvPicPr>
@@ -23126,7 +23174,7 @@
       </p:pic>
       <p:sp>
         <p:nvSpPr>
-          <p:cNvPr id="362" name="Google Shape;362;p57"/>
+          <p:cNvPr id="364" name="Google Shape;364;p57"/>
           <p:cNvSpPr txBox="1"/>
           <p:nvPr>
             <p:ph type="title"/>
@@ -23174,7 +23222,7 @@
       </p:sp>
       <p:sp>
         <p:nvSpPr>
-          <p:cNvPr id="363" name="Google Shape;363;p57"/>
+          <p:cNvPr id="365" name="Google Shape;365;p57"/>
           <p:cNvSpPr txBox="1"/>
           <p:nvPr>
             <p:ph idx="12" type="sldNum"/>
@@ -23214,7 +23262,7 @@
       </p:sp>
       <p:sp>
         <p:nvSpPr>
-          <p:cNvPr id="364" name="Google Shape;364;p57"/>
+          <p:cNvPr id="366" name="Google Shape;366;p57"/>
           <p:cNvSpPr txBox="1"/>
           <p:nvPr/>
         </p:nvSpPr>
@@ -23268,7 +23316,7 @@
       </p:sp>
       <p:sp>
         <p:nvSpPr>
-          <p:cNvPr id="365" name="Google Shape;365;p57"/>
+          <p:cNvPr id="367" name="Google Shape;367;p57"/>
           <p:cNvSpPr txBox="1"/>
           <p:nvPr/>
         </p:nvSpPr>
@@ -23309,7 +23357,7 @@
       </p:sp>
       <p:sp>
         <p:nvSpPr>
-          <p:cNvPr id="366" name="Google Shape;366;p57"/>
+          <p:cNvPr id="368" name="Google Shape;368;p57"/>
           <p:cNvSpPr txBox="1"/>
           <p:nvPr/>
         </p:nvSpPr>
@@ -23403,7 +23451,7 @@
       </p:sp>
       <p:sp>
         <p:nvSpPr>
-          <p:cNvPr id="367" name="Google Shape;367;p57"/>
+          <p:cNvPr id="369" name="Google Shape;369;p57"/>
           <p:cNvSpPr txBox="1"/>
           <p:nvPr/>
         </p:nvSpPr>
@@ -23457,7 +23505,7 @@
       </p:sp>
       <p:sp>
         <p:nvSpPr>
-          <p:cNvPr id="368" name="Google Shape;368;p57"/>
+          <p:cNvPr id="370" name="Google Shape;370;p57"/>
           <p:cNvSpPr txBox="1"/>
           <p:nvPr/>
         </p:nvSpPr>
@@ -23551,7 +23599,7 @@
       </p:sp>
       <p:sp>
         <p:nvSpPr>
-          <p:cNvPr id="369" name="Google Shape;369;p57"/>
+          <p:cNvPr id="371" name="Google Shape;371;p57"/>
           <p:cNvSpPr txBox="1"/>
           <p:nvPr/>
         </p:nvSpPr>
@@ -23605,7 +23653,7 @@
       </p:sp>
       <p:sp>
         <p:nvSpPr>
-          <p:cNvPr id="370" name="Google Shape;370;p57"/>
+          <p:cNvPr id="372" name="Google Shape;372;p57"/>
           <p:cNvSpPr txBox="1"/>
           <p:nvPr/>
         </p:nvSpPr>
@@ -23699,7 +23747,7 @@
       </p:sp>
       <p:sp>
         <p:nvSpPr>
-          <p:cNvPr id="371" name="Google Shape;371;p57"/>
+          <p:cNvPr id="373" name="Google Shape;373;p57"/>
           <p:cNvSpPr txBox="1"/>
           <p:nvPr/>
         </p:nvSpPr>
@@ -23741,7 +23789,7 @@
       </p:sp>
       <p:sp>
         <p:nvSpPr>
-          <p:cNvPr id="372" name="Google Shape;372;p57"/>
+          <p:cNvPr id="374" name="Google Shape;374;p57"/>
           <p:cNvSpPr txBox="1"/>
           <p:nvPr/>
         </p:nvSpPr>
@@ -23783,7 +23831,7 @@
       </p:sp>
       <p:sp>
         <p:nvSpPr>
-          <p:cNvPr id="373" name="Google Shape;373;p57"/>
+          <p:cNvPr id="375" name="Google Shape;375;p57"/>
           <p:cNvSpPr txBox="1"/>
           <p:nvPr/>
         </p:nvSpPr>
@@ -23823,6 +23871,85 @@
           </a:p>
         </p:txBody>
       </p:sp>
+      <p:sp>
+        <p:nvSpPr>
+          <p:cNvPr id="376" name="Google Shape;376;p57"/>
+          <p:cNvSpPr txBox="1"/>
+          <p:nvPr/>
+        </p:nvSpPr>
+        <p:spPr>
+          <a:xfrm>
+            <a:off x="4243675" y="4099250"/>
+            <a:ext cx="4154700" cy="400200"/>
+          </a:xfrm>
+          <a:prstGeom prst="rect">
+            <a:avLst/>
+          </a:prstGeom>
+          <a:noFill/>
+          <a:ln>
+            <a:noFill/>
+          </a:ln>
+        </p:spPr>
+        <p:txBody>
+          <a:bodyPr anchorCtr="0" anchor="t" bIns="91425" lIns="91425" spcFirstLastPara="1" rIns="91425" wrap="square" tIns="91425">
+            <a:spAutoFit/>
+          </a:bodyPr>
+          <a:lstStyle/>
+          <a:p>
+            <a:pPr indent="0" lvl="0" marL="0" rtl="0" algn="l">
+              <a:spcBef>
+                <a:spcPts val="0"/>
+              </a:spcBef>
+              <a:spcAft>
+                <a:spcPts val="0"/>
+              </a:spcAft>
+              <a:buNone/>
+            </a:pPr>
+            <a:r>
+              <a:rPr lang="en" u="sng">
+                <a:solidFill>
+                  <a:schemeClr val="hlink"/>
+                </a:solidFill>
+                <a:hlinkClick r:id="rId4"/>
+              </a:rPr>
+              <a:t>https://forms.gle/4pYqDEqpw4orJ4Vz6</a:t>
+            </a:r>
+            <a:r>
+              <a:rPr lang="en"/>
+              <a:t> </a:t>
+            </a:r>
+            <a:endParaRPr/>
+          </a:p>
+        </p:txBody>
+      </p:sp>
+      <p:pic>
+        <p:nvPicPr>
+          <p:cNvPr id="377" name="Google Shape;377;p57"/>
+          <p:cNvPicPr preferRelativeResize="0"/>
+          <p:nvPr/>
+        </p:nvPicPr>
+        <p:blipFill>
+          <a:blip r:embed="rId5">
+            <a:alphaModFix/>
+          </a:blip>
+          <a:stretch>
+            <a:fillRect/>
+          </a:stretch>
+        </p:blipFill>
+        <p:spPr>
+          <a:xfrm>
+            <a:off x="7974500" y="3695821"/>
+            <a:ext cx="746051" cy="746051"/>
+          </a:xfrm>
+          <a:prstGeom prst="rect">
+            <a:avLst/>
+          </a:prstGeom>
+          <a:noFill/>
+          <a:ln>
+            <a:noFill/>
+          </a:ln>
+        </p:spPr>
+      </p:pic>
     </p:spTree>
   </p:cSld>
   <p:clrMapOvr>
@@ -23836,112 +23963,6 @@
             <p:seq concurrent="1" nextAc="seek">
               <p:cTn dur="indefinite" id="2" nodeType="mainSeq">
                 <p:childTnLst>
-                  <p:par>
-                    <p:cTn fill="hold">
-                      <p:stCondLst>
-                        <p:cond delay="indefinite"/>
-                      </p:stCondLst>
-                      <p:childTnLst>
-                        <p:par>
-                          <p:cTn fill="hold">
-                            <p:stCondLst>
-                              <p:cond delay="0"/>
-                            </p:stCondLst>
-                            <p:childTnLst>
-                              <p:par>
-                                <p:cTn fill="hold" nodeType="clickEffect" presetClass="entr" presetID="10" presetSubtype="0">
-                                  <p:stCondLst>
-                                    <p:cond delay="0"/>
-                                  </p:stCondLst>
-                                  <p:childTnLst>
-                                    <p:set>
-                                      <p:cBhvr>
-                                        <p:cTn dur="1" fill="hold">
-                                          <p:stCondLst>
-                                            <p:cond delay="0"/>
-                                          </p:stCondLst>
-                                        </p:cTn>
-                                        <p:tgtEl>
-                                          <p:spTgt spid="371"/>
-                                        </p:tgtEl>
-                                        <p:attrNameLst>
-                                          <p:attrName>style.visibility</p:attrName>
-                                        </p:attrNameLst>
-                                      </p:cBhvr>
-                                      <p:to>
-                                        <p:strVal val="visible"/>
-                                      </p:to>
-                                    </p:set>
-                                    <p:animEffect filter="fade" transition="in">
-                                      <p:cBhvr>
-                                        <p:cTn dur="1000"/>
-                                        <p:tgtEl>
-                                          <p:spTgt spid="371"/>
-                                        </p:tgtEl>
-                                      </p:cBhvr>
-                                    </p:animEffect>
-                                  </p:childTnLst>
-                                </p:cTn>
-                              </p:par>
-                            </p:childTnLst>
-                          </p:cTn>
-                        </p:par>
-                      </p:childTnLst>
-                    </p:cTn>
-                  </p:par>
-                  <p:par>
-                    <p:cTn fill="hold">
-                      <p:stCondLst>
-                        <p:cond delay="indefinite"/>
-                      </p:stCondLst>
-                      <p:childTnLst>
-                        <p:par>
-                          <p:cTn fill="hold">
-                            <p:stCondLst>
-                              <p:cond delay="0"/>
-                            </p:stCondLst>
-                            <p:childTnLst>
-                              <p:par>
-                                <p:cTn fill="hold" nodeType="clickEffect" presetClass="entr" presetID="10" presetSubtype="0">
-                                  <p:stCondLst>
-                                    <p:cond delay="0"/>
-                                  </p:stCondLst>
-                                  <p:childTnLst>
-                                    <p:set>
-                                      <p:cBhvr>
-                                        <p:cTn dur="1" fill="hold">
-                                          <p:stCondLst>
-                                            <p:cond delay="0"/>
-                                          </p:stCondLst>
-                                        </p:cTn>
-                                        <p:tgtEl>
-                                          <p:spTgt spid="372"/>
-                                        </p:tgtEl>
-                                        <p:attrNameLst>
-                                          <p:attrName>style.visibility</p:attrName>
-                                        </p:attrNameLst>
-                                      </p:cBhvr>
-                                      <p:to>
-                                        <p:strVal val="visible"/>
-                                      </p:to>
-                                    </p:set>
-                                    <p:animEffect filter="fade" transition="in">
-                                      <p:cBhvr>
-                                        <p:cTn dur="1000"/>
-                                        <p:tgtEl>
-                                          <p:spTgt spid="372"/>
-                                        </p:tgtEl>
-                                      </p:cBhvr>
-                                    </p:animEffect>
-                                  </p:childTnLst>
-                                </p:cTn>
-                              </p:par>
-                            </p:childTnLst>
-                          </p:cTn>
-                        </p:par>
-                      </p:childTnLst>
-                    </p:cTn>
-                  </p:par>
                   <p:par>
                     <p:cTn fill="hold">
                       <p:stCondLst>
@@ -23995,6 +24016,112 @@
                       </p:childTnLst>
                     </p:cTn>
                   </p:par>
+                  <p:par>
+                    <p:cTn fill="hold">
+                      <p:stCondLst>
+                        <p:cond delay="indefinite"/>
+                      </p:stCondLst>
+                      <p:childTnLst>
+                        <p:par>
+                          <p:cTn fill="hold">
+                            <p:stCondLst>
+                              <p:cond delay="0"/>
+                            </p:stCondLst>
+                            <p:childTnLst>
+                              <p:par>
+                                <p:cTn fill="hold" nodeType="clickEffect" presetClass="entr" presetID="10" presetSubtype="0">
+                                  <p:stCondLst>
+                                    <p:cond delay="0"/>
+                                  </p:stCondLst>
+                                  <p:childTnLst>
+                                    <p:set>
+                                      <p:cBhvr>
+                                        <p:cTn dur="1" fill="hold">
+                                          <p:stCondLst>
+                                            <p:cond delay="0"/>
+                                          </p:stCondLst>
+                                        </p:cTn>
+                                        <p:tgtEl>
+                                          <p:spTgt spid="374"/>
+                                        </p:tgtEl>
+                                        <p:attrNameLst>
+                                          <p:attrName>style.visibility</p:attrName>
+                                        </p:attrNameLst>
+                                      </p:cBhvr>
+                                      <p:to>
+                                        <p:strVal val="visible"/>
+                                      </p:to>
+                                    </p:set>
+                                    <p:animEffect filter="fade" transition="in">
+                                      <p:cBhvr>
+                                        <p:cTn dur="1000"/>
+                                        <p:tgtEl>
+                                          <p:spTgt spid="374"/>
+                                        </p:tgtEl>
+                                      </p:cBhvr>
+                                    </p:animEffect>
+                                  </p:childTnLst>
+                                </p:cTn>
+                              </p:par>
+                            </p:childTnLst>
+                          </p:cTn>
+                        </p:par>
+                      </p:childTnLst>
+                    </p:cTn>
+                  </p:par>
+                  <p:par>
+                    <p:cTn fill="hold">
+                      <p:stCondLst>
+                        <p:cond delay="indefinite"/>
+                      </p:stCondLst>
+                      <p:childTnLst>
+                        <p:par>
+                          <p:cTn fill="hold">
+                            <p:stCondLst>
+                              <p:cond delay="0"/>
+                            </p:stCondLst>
+                            <p:childTnLst>
+                              <p:par>
+                                <p:cTn fill="hold" nodeType="clickEffect" presetClass="entr" presetID="10" presetSubtype="0">
+                                  <p:stCondLst>
+                                    <p:cond delay="0"/>
+                                  </p:stCondLst>
+                                  <p:childTnLst>
+                                    <p:set>
+                                      <p:cBhvr>
+                                        <p:cTn dur="1" fill="hold">
+                                          <p:stCondLst>
+                                            <p:cond delay="0"/>
+                                          </p:stCondLst>
+                                        </p:cTn>
+                                        <p:tgtEl>
+                                          <p:spTgt spid="375"/>
+                                        </p:tgtEl>
+                                        <p:attrNameLst>
+                                          <p:attrName>style.visibility</p:attrName>
+                                        </p:attrNameLst>
+                                      </p:cBhvr>
+                                      <p:to>
+                                        <p:strVal val="visible"/>
+                                      </p:to>
+                                    </p:set>
+                                    <p:animEffect filter="fade" transition="in">
+                                      <p:cBhvr>
+                                        <p:cTn dur="1000"/>
+                                        <p:tgtEl>
+                                          <p:spTgt spid="375"/>
+                                        </p:tgtEl>
+                                      </p:cBhvr>
+                                    </p:animEffect>
+                                  </p:childTnLst>
+                                </p:cTn>
+                              </p:par>
+                            </p:childTnLst>
+                          </p:cTn>
+                        </p:par>
+                      </p:childTnLst>
+                    </p:cTn>
+                  </p:par>
                 </p:childTnLst>
               </p:cTn>
               <p:prevCondLst>
@@ -24025,7 +24152,7 @@
   <p:cSld>
     <p:spTree>
       <p:nvGrpSpPr>
-        <p:cNvPr id="377" name="Shape 377"/>
+        <p:cNvPr id="381" name="Shape 381"/>
         <p:cNvGrpSpPr/>
         <p:nvPr/>
       </p:nvGrpSpPr>
@@ -24039,7 +24166,7 @@
       </p:grpSpPr>
       <p:pic>
         <p:nvPicPr>
-          <p:cNvPr id="378" name="Google Shape;378;p58"/>
+          <p:cNvPr id="382" name="Google Shape;382;p58"/>
           <p:cNvPicPr preferRelativeResize="0"/>
           <p:nvPr/>
         </p:nvPicPr>
@@ -24067,7 +24194,7 @@
       </p:pic>
       <p:sp>
         <p:nvSpPr>
-          <p:cNvPr id="379" name="Google Shape;379;p58"/>
+          <p:cNvPr id="383" name="Google Shape;383;p58"/>
           <p:cNvSpPr txBox="1"/>
           <p:nvPr>
             <p:ph type="title"/>
@@ -24075,7 +24202,7 @@
         </p:nvSpPr>
         <p:spPr>
           <a:xfrm>
-            <a:off x="311700" y="109850"/>
+            <a:off x="311700" y="227050"/>
             <a:ext cx="8520600" cy="607800"/>
           </a:xfrm>
           <a:prstGeom prst="rect">
@@ -24088,7 +24215,7 @@
           </a:bodyPr>
           <a:lstStyle/>
           <a:p>
-            <a:pPr indent="0" lvl="0" marL="0" rtl="0" algn="l">
+            <a:pPr indent="0" lvl="0" marL="0" rtl="0" algn="ctr">
               <a:spcBef>
                 <a:spcPts val="0"/>
               </a:spcBef>
@@ -24115,14 +24242,14 @@
       </p:sp>
       <p:sp>
         <p:nvSpPr>
-          <p:cNvPr id="380" name="Google Shape;380;p58"/>
+          <p:cNvPr id="384" name="Google Shape;384;p58"/>
           <p:cNvSpPr txBox="1"/>
           <p:nvPr/>
         </p:nvSpPr>
         <p:spPr>
           <a:xfrm>
-            <a:off x="311700" y="717650"/>
-            <a:ext cx="8697300" cy="2130300"/>
+            <a:off x="223350" y="1190475"/>
+            <a:ext cx="8697300" cy="2386800"/>
           </a:xfrm>
           <a:prstGeom prst="rect">
             <a:avLst/>
@@ -24163,7 +24290,7 @@
                 <a:spcPct val="115000"/>
               </a:lnSpc>
               <a:spcBef>
-                <a:spcPts val="0"/>
+                <a:spcPts val="1000"/>
               </a:spcBef>
               <a:spcAft>
                 <a:spcPts val="0"/>
@@ -24187,10 +24314,10 @@
                 <a:spcPct val="115000"/>
               </a:lnSpc>
               <a:spcBef>
-                <a:spcPts val="0"/>
-              </a:spcBef>
-              <a:spcAft>
-                <a:spcPts val="0"/>
+                <a:spcPts val="1000"/>
+              </a:spcBef>
+              <a:spcAft>
+                <a:spcPts val="1000"/>
               </a:spcAft>
               <a:buSzPts val="1600"/>
               <a:buChar char="●"/>
@@ -24205,7 +24332,7 @@
       </p:sp>
       <p:sp>
         <p:nvSpPr>
-          <p:cNvPr id="381" name="Google Shape;381;p58"/>
+          <p:cNvPr id="385" name="Google Shape;385;p58"/>
           <p:cNvSpPr txBox="1"/>
           <p:nvPr>
             <p:ph idx="12" type="sldNum"/>
@@ -24251,6 +24378,34 @@
           </a:p>
         </p:txBody>
       </p:sp>
+      <p:pic>
+        <p:nvPicPr>
+          <p:cNvPr id="386" name="Google Shape;386;p58"/>
+          <p:cNvPicPr preferRelativeResize="0"/>
+          <p:nvPr/>
+        </p:nvPicPr>
+        <p:blipFill>
+          <a:blip r:embed="rId4">
+            <a:alphaModFix/>
+          </a:blip>
+          <a:stretch>
+            <a:fillRect/>
+          </a:stretch>
+        </p:blipFill>
+        <p:spPr>
+          <a:xfrm>
+            <a:off x="2295750" y="0"/>
+            <a:ext cx="1061900" cy="1061900"/>
+          </a:xfrm>
+          <a:prstGeom prst="rect">
+            <a:avLst/>
+          </a:prstGeom>
+          <a:noFill/>
+          <a:ln>
+            <a:noFill/>
+          </a:ln>
+        </p:spPr>
+      </p:pic>
     </p:spTree>
   </p:cSld>
   <p:clrMapOvr>
@@ -24675,7 +24830,7 @@
           </a:bodyPr>
           <a:lstStyle/>
           <a:p>
-            <a:pPr indent="0" lvl="0" marL="0" rtl="0" algn="l">
+            <a:pPr indent="0" lvl="0" marL="0" rtl="0" algn="ctr">
               <a:spcBef>
                 <a:spcPts val="0"/>
               </a:spcBef>
@@ -24708,8 +24863,8 @@
         </p:nvSpPr>
         <p:spPr>
           <a:xfrm>
-            <a:off x="3996800" y="717650"/>
-            <a:ext cx="5012400" cy="3263100"/>
+            <a:off x="4010300" y="1985813"/>
+            <a:ext cx="5012400" cy="2258400"/>
           </a:xfrm>
           <a:prstGeom prst="rect">
             <a:avLst/>
@@ -24740,34 +24895,6 @@
             </a:pPr>
             <a:r>
               <a:rPr lang="en" sz="1600"/>
-              <a:t>Hyperparameters are </a:t>
-            </a:r>
-            <a:r>
-              <a:rPr b="1" lang="en" sz="1600"/>
-              <a:t>meta parameters</a:t>
-            </a:r>
-            <a:r>
-              <a:rPr lang="en" sz="1600"/>
-              <a:t> that are associated with any ML algorithms and are usually set before the model training and building process.</a:t>
-            </a:r>
-            <a:endParaRPr sz="1600"/>
-          </a:p>
-          <a:p>
-            <a:pPr indent="-330200" lvl="0" marL="457200" rtl="0" algn="l">
-              <a:lnSpc>
-                <a:spcPct val="115000"/>
-              </a:lnSpc>
-              <a:spcBef>
-                <a:spcPts val="0"/>
-              </a:spcBef>
-              <a:spcAft>
-                <a:spcPts val="0"/>
-              </a:spcAft>
-              <a:buSzPts val="1600"/>
-              <a:buChar char="●"/>
-            </a:pPr>
-            <a:r>
-              <a:rPr lang="en" sz="1600"/>
               <a:t>Hyperparameters are different from model parameters since they do not have dependency on the data.</a:t>
             </a:r>
             <a:endParaRPr sz="1600"/>
@@ -24778,10 +24905,10 @@
                 <a:spcPct val="115000"/>
               </a:lnSpc>
               <a:spcBef>
-                <a:spcPts val="0"/>
-              </a:spcBef>
-              <a:spcAft>
-                <a:spcPts val="0"/>
+                <a:spcPts val="1000"/>
+              </a:spcBef>
+              <a:spcAft>
+                <a:spcPts val="1000"/>
               </a:spcAft>
               <a:buSzPts val="1600"/>
               <a:buChar char="●"/>
@@ -24907,8 +25034,8 @@
         </p:blipFill>
         <p:spPr>
           <a:xfrm>
-            <a:off x="311700" y="1124000"/>
-            <a:ext cx="3629426" cy="2042700"/>
+            <a:off x="219450" y="1782950"/>
+            <a:ext cx="3874749" cy="2180775"/>
           </a:xfrm>
           <a:prstGeom prst="rect">
             <a:avLst/>
@@ -24927,8 +25054,8 @@
         </p:nvSpPr>
         <p:spPr>
           <a:xfrm>
-            <a:off x="1711221" y="3211675"/>
-            <a:ext cx="1409400" cy="384900"/>
+            <a:off x="1188677" y="4088875"/>
+            <a:ext cx="1932000" cy="384900"/>
           </a:xfrm>
           <a:prstGeom prst="rect">
             <a:avLst/>
@@ -24960,7 +25087,7 @@
                 <a:cs typeface="Roboto"/>
                 <a:sym typeface="Roboto"/>
               </a:rPr>
-              <a:t>(</a:t>
+              <a:t>(source: </a:t>
             </a:r>
             <a:r>
               <a:rPr lang="en" sz="1300">
@@ -24989,6 +25116,89 @@
           </a:p>
         </p:txBody>
       </p:sp>
+      <p:sp>
+        <p:nvSpPr>
+          <p:cNvPr id="207" name="Google Shape;207;p40"/>
+          <p:cNvSpPr txBox="1"/>
+          <p:nvPr/>
+        </p:nvSpPr>
+        <p:spPr>
+          <a:xfrm>
+            <a:off x="1386575" y="805425"/>
+            <a:ext cx="7069500" cy="714300"/>
+          </a:xfrm>
+          <a:prstGeom prst="rect">
+            <a:avLst/>
+          </a:prstGeom>
+          <a:solidFill>
+            <a:srgbClr val="FFF2CC"/>
+          </a:solidFill>
+          <a:ln>
+            <a:noFill/>
+          </a:ln>
+        </p:spPr>
+        <p:txBody>
+          <a:bodyPr anchorCtr="0" anchor="t" bIns="91425" lIns="91425" spcFirstLastPara="1" rIns="91425" wrap="square" tIns="91425">
+            <a:spAutoFit/>
+          </a:bodyPr>
+          <a:lstStyle/>
+          <a:p>
+            <a:pPr indent="0" lvl="0" marL="0" rtl="0" algn="l">
+              <a:lnSpc>
+                <a:spcPct val="115000"/>
+              </a:lnSpc>
+              <a:spcBef>
+                <a:spcPts val="0"/>
+              </a:spcBef>
+              <a:spcAft>
+                <a:spcPts val="1000"/>
+              </a:spcAft>
+              <a:buNone/>
+            </a:pPr>
+            <a:r>
+              <a:rPr lang="en" sz="1600"/>
+              <a:t>Hyperparameters are </a:t>
+            </a:r>
+            <a:r>
+              <a:rPr b="1" lang="en" sz="1600"/>
+              <a:t>meta parameters</a:t>
+            </a:r>
+            <a:r>
+              <a:rPr lang="en" sz="1600"/>
+              <a:t> that are associated with any ML algorithm and are usually set before the model training and building process.</a:t>
+            </a:r>
+            <a:endParaRPr/>
+          </a:p>
+        </p:txBody>
+      </p:sp>
+      <p:pic>
+        <p:nvPicPr>
+          <p:cNvPr id="208" name="Google Shape;208;p40"/>
+          <p:cNvPicPr preferRelativeResize="0"/>
+          <p:nvPr/>
+        </p:nvPicPr>
+        <p:blipFill>
+          <a:blip r:embed="rId5">
+            <a:alphaModFix/>
+          </a:blip>
+          <a:stretch>
+            <a:fillRect/>
+          </a:stretch>
+        </p:blipFill>
+        <p:spPr>
+          <a:xfrm>
+            <a:off x="311700" y="782475"/>
+            <a:ext cx="1112259" cy="714300"/>
+          </a:xfrm>
+          <a:prstGeom prst="rect">
+            <a:avLst/>
+          </a:prstGeom>
+          <a:noFill/>
+          <a:ln>
+            <a:noFill/>
+          </a:ln>
+        </p:spPr>
+      </p:pic>
     </p:spTree>
   </p:cSld>
   <p:clrMapOvr>
@@ -25002,7 +25212,7 @@
   <p:cSld>
     <p:spTree>
       <p:nvGrpSpPr>
-        <p:cNvPr id="210" name="Shape 210"/>
+        <p:cNvPr id="212" name="Shape 212"/>
         <p:cNvGrpSpPr/>
         <p:nvPr/>
       </p:nvGrpSpPr>
@@ -25016,7 +25226,7 @@
       </p:grpSpPr>
       <p:pic>
         <p:nvPicPr>
-          <p:cNvPr id="211" name="Google Shape;211;p41"/>
+          <p:cNvPr id="213" name="Google Shape;213;p41"/>
           <p:cNvPicPr preferRelativeResize="0"/>
           <p:nvPr/>
         </p:nvPicPr>
@@ -25044,7 +25254,7 @@
       </p:pic>
       <p:sp>
         <p:nvSpPr>
-          <p:cNvPr id="212" name="Google Shape;212;p41"/>
+          <p:cNvPr id="214" name="Google Shape;214;p41"/>
           <p:cNvSpPr txBox="1"/>
           <p:nvPr>
             <p:ph type="title"/>
@@ -25065,7 +25275,7 @@
           </a:bodyPr>
           <a:lstStyle/>
           <a:p>
-            <a:pPr indent="0" lvl="0" marL="0" rtl="0" algn="l">
+            <a:pPr indent="0" lvl="0" marL="0" rtl="0" algn="ctr">
               <a:spcBef>
                 <a:spcPts val="0"/>
               </a:spcBef>
@@ -25092,7 +25302,7 @@
       </p:sp>
       <p:sp>
         <p:nvSpPr>
-          <p:cNvPr id="213" name="Google Shape;213;p41"/>
+          <p:cNvPr id="215" name="Google Shape;215;p41"/>
           <p:cNvSpPr txBox="1"/>
           <p:nvPr/>
         </p:nvSpPr>
@@ -25366,7 +25576,7 @@
       </p:sp>
       <p:sp>
         <p:nvSpPr>
-          <p:cNvPr id="214" name="Google Shape;214;p41"/>
+          <p:cNvPr id="216" name="Google Shape;216;p41"/>
           <p:cNvSpPr txBox="1"/>
           <p:nvPr>
             <p:ph idx="12" type="sldNum"/>
@@ -25425,7 +25635,7 @@
   <p:cSld>
     <p:spTree>
       <p:nvGrpSpPr>
-        <p:cNvPr id="218" name="Shape 218"/>
+        <p:cNvPr id="220" name="Shape 220"/>
         <p:cNvGrpSpPr/>
         <p:nvPr/>
       </p:nvGrpSpPr>
@@ -25439,7 +25649,7 @@
       </p:grpSpPr>
       <p:pic>
         <p:nvPicPr>
-          <p:cNvPr id="219" name="Google Shape;219;p42"/>
+          <p:cNvPr id="221" name="Google Shape;221;p42"/>
           <p:cNvPicPr preferRelativeResize="0"/>
           <p:nvPr/>
         </p:nvPicPr>
@@ -25467,7 +25677,7 @@
       </p:pic>
       <p:sp>
         <p:nvSpPr>
-          <p:cNvPr id="220" name="Google Shape;220;p42"/>
+          <p:cNvPr id="222" name="Google Shape;222;p42"/>
           <p:cNvSpPr txBox="1"/>
           <p:nvPr>
             <p:ph type="title"/>
@@ -25488,7 +25698,7 @@
           </a:bodyPr>
           <a:lstStyle/>
           <a:p>
-            <a:pPr indent="0" lvl="0" marL="0" rtl="0" algn="l">
+            <a:pPr indent="0" lvl="0" marL="0" rtl="0" algn="ctr">
               <a:spcBef>
                 <a:spcPts val="0"/>
               </a:spcBef>
@@ -25515,14 +25725,14 @@
       </p:sp>
       <p:sp>
         <p:nvSpPr>
-          <p:cNvPr id="221" name="Google Shape;221;p42"/>
+          <p:cNvPr id="223" name="Google Shape;223;p42"/>
           <p:cNvSpPr txBox="1"/>
           <p:nvPr/>
         </p:nvSpPr>
         <p:spPr>
           <a:xfrm>
-            <a:off x="415500" y="906275"/>
-            <a:ext cx="8313000" cy="2853600"/>
+            <a:off x="415500" y="952500"/>
+            <a:ext cx="8313000" cy="3238500"/>
           </a:xfrm>
           <a:prstGeom prst="rect">
             <a:avLst/>
@@ -25563,7 +25773,7 @@
                 <a:spcPct val="115000"/>
               </a:lnSpc>
               <a:spcBef>
-                <a:spcPts val="0"/>
+                <a:spcPts val="1000"/>
               </a:spcBef>
               <a:spcAft>
                 <a:spcPts val="0"/>
@@ -25583,7 +25793,7 @@
                 <a:spcPct val="115000"/>
               </a:lnSpc>
               <a:spcBef>
-                <a:spcPts val="0"/>
+                <a:spcPts val="1000"/>
               </a:spcBef>
               <a:spcAft>
                 <a:spcPts val="0"/>
@@ -25603,10 +25813,10 @@
                 <a:spcPct val="115000"/>
               </a:lnSpc>
               <a:spcBef>
-                <a:spcPts val="0"/>
-              </a:spcBef>
-              <a:spcAft>
-                <a:spcPts val="0"/>
+                <a:spcPts val="1000"/>
+              </a:spcBef>
+              <a:spcAft>
+                <a:spcPts val="1000"/>
               </a:spcAft>
               <a:buSzPts val="1700"/>
               <a:buChar char="●"/>
@@ -25621,7 +25831,7 @@
       </p:sp>
       <p:sp>
         <p:nvSpPr>
-          <p:cNvPr id="222" name="Google Shape;222;p42"/>
+          <p:cNvPr id="224" name="Google Shape;224;p42"/>
           <p:cNvSpPr txBox="1"/>
           <p:nvPr>
             <p:ph idx="12" type="sldNum"/>
@@ -25680,7 +25890,7 @@
   <p:cSld>
     <p:spTree>
       <p:nvGrpSpPr>
-        <p:cNvPr id="226" name="Shape 226"/>
+        <p:cNvPr id="228" name="Shape 228"/>
         <p:cNvGrpSpPr/>
         <p:nvPr/>
       </p:nvGrpSpPr>
@@ -25694,7 +25904,7 @@
       </p:grpSpPr>
       <p:pic>
         <p:nvPicPr>
-          <p:cNvPr id="227" name="Google Shape;227;p43"/>
+          <p:cNvPr id="229" name="Google Shape;229;p43"/>
           <p:cNvPicPr preferRelativeResize="0"/>
           <p:nvPr/>
         </p:nvPicPr>
@@ -25722,7 +25932,7 @@
       </p:pic>
       <p:sp>
         <p:nvSpPr>
-          <p:cNvPr id="228" name="Google Shape;228;p43"/>
+          <p:cNvPr id="230" name="Google Shape;230;p43"/>
           <p:cNvSpPr txBox="1"/>
           <p:nvPr>
             <p:ph type="title"/>
@@ -25743,7 +25953,7 @@
           </a:bodyPr>
           <a:lstStyle/>
           <a:p>
-            <a:pPr indent="0" lvl="0" marL="0" rtl="0" algn="l">
+            <a:pPr indent="0" lvl="0" marL="0" rtl="0" algn="ctr">
               <a:spcBef>
                 <a:spcPts val="0"/>
               </a:spcBef>
@@ -25778,14 +25988,14 @@
       </p:sp>
       <p:sp>
         <p:nvSpPr>
-          <p:cNvPr id="229" name="Google Shape;229;p43"/>
+          <p:cNvPr id="231" name="Google Shape;231;p43"/>
           <p:cNvSpPr txBox="1"/>
           <p:nvPr/>
         </p:nvSpPr>
         <p:spPr>
           <a:xfrm>
             <a:off x="415650" y="837000"/>
-            <a:ext cx="8312700" cy="1950900"/>
+            <a:ext cx="8312700" cy="2207400"/>
           </a:xfrm>
           <a:prstGeom prst="rect">
             <a:avLst/>
@@ -25816,7 +26026,7 @@
             </a:pPr>
             <a:r>
               <a:rPr lang="en" sz="1700"/>
-              <a:t>This error arises due to model sensitivity to fluctuations in the dataset such as new data points, features, randomness, noise etc.</a:t>
+              <a:t>This error arises due to model sensitivity to fluctuations in the dataset such as new data points, randomness, noise etc.</a:t>
             </a:r>
             <a:endParaRPr sz="1700"/>
           </a:p>
@@ -25826,7 +26036,7 @@
                 <a:spcPct val="115000"/>
               </a:lnSpc>
               <a:spcBef>
-                <a:spcPts val="0"/>
+                <a:spcPts val="1000"/>
               </a:spcBef>
               <a:spcAft>
                 <a:spcPts val="0"/>
@@ -25846,10 +26056,10 @@
                 <a:spcPct val="115000"/>
               </a:lnSpc>
               <a:spcBef>
-                <a:spcPts val="0"/>
-              </a:spcBef>
-              <a:spcAft>
-                <a:spcPts val="0"/>
+                <a:spcPts val="1000"/>
+              </a:spcBef>
+              <a:spcAft>
+                <a:spcPts val="1000"/>
               </a:spcAft>
               <a:buSzPts val="1700"/>
               <a:buChar char="●"/>
@@ -25864,7 +26074,7 @@
       </p:sp>
       <p:sp>
         <p:nvSpPr>
-          <p:cNvPr id="230" name="Google Shape;230;p43"/>
+          <p:cNvPr id="232" name="Google Shape;232;p43"/>
           <p:cNvSpPr txBox="1"/>
           <p:nvPr>
             <p:ph idx="12" type="sldNum"/>
@@ -25923,7 +26133,7 @@
   <p:cSld>
     <p:spTree>
       <p:nvGrpSpPr>
-        <p:cNvPr id="234" name="Shape 234"/>
+        <p:cNvPr id="236" name="Shape 236"/>
         <p:cNvGrpSpPr/>
         <p:nvPr/>
       </p:nvGrpSpPr>
@@ -25937,7 +26147,7 @@
       </p:grpSpPr>
       <p:pic>
         <p:nvPicPr>
-          <p:cNvPr id="235" name="Google Shape;235;p44"/>
+          <p:cNvPr id="237" name="Google Shape;237;p44"/>
           <p:cNvPicPr preferRelativeResize="0"/>
           <p:nvPr/>
         </p:nvPicPr>
@@ -25965,7 +26175,7 @@
       </p:pic>
       <p:sp>
         <p:nvSpPr>
-          <p:cNvPr id="236" name="Google Shape;236;p44"/>
+          <p:cNvPr id="238" name="Google Shape;238;p44"/>
           <p:cNvSpPr txBox="1"/>
           <p:nvPr>
             <p:ph type="title"/>
@@ -25986,7 +26196,7 @@
           </a:bodyPr>
           <a:lstStyle/>
           <a:p>
-            <a:pPr indent="0" lvl="0" marL="0" rtl="0" algn="l">
+            <a:pPr indent="0" lvl="0" marL="0" rtl="0" algn="ctr">
               <a:spcBef>
                 <a:spcPts val="0"/>
               </a:spcBef>
@@ -26021,7 +26231,7 @@
       </p:sp>
       <p:sp>
         <p:nvSpPr>
-          <p:cNvPr id="237" name="Google Shape;237;p44"/>
+          <p:cNvPr id="239" name="Google Shape;239;p44"/>
           <p:cNvSpPr txBox="1"/>
           <p:nvPr>
             <p:ph idx="12" type="sldNum"/>
@@ -26069,7 +26279,7 @@
       </p:sp>
       <p:pic>
         <p:nvPicPr>
-          <p:cNvPr id="238" name="Google Shape;238;p44"/>
+          <p:cNvPr id="240" name="Google Shape;240;p44"/>
           <p:cNvPicPr preferRelativeResize="0"/>
           <p:nvPr/>
         </p:nvPicPr>
@@ -26097,14 +26307,14 @@
       </p:pic>
       <p:sp>
         <p:nvSpPr>
-          <p:cNvPr id="239" name="Google Shape;239;p44"/>
+          <p:cNvPr id="241" name="Google Shape;241;p44"/>
           <p:cNvSpPr txBox="1"/>
           <p:nvPr/>
         </p:nvSpPr>
         <p:spPr>
           <a:xfrm>
             <a:off x="3678825" y="4341000"/>
-            <a:ext cx="1630500" cy="369300"/>
+            <a:ext cx="2453400" cy="369300"/>
           </a:xfrm>
           <a:prstGeom prst="rect">
             <a:avLst/>
@@ -26136,7 +26346,7 @@
                 <a:cs typeface="Roboto"/>
                 <a:sym typeface="Roboto"/>
               </a:rPr>
-              <a:t>(Sarkar et al. 2018)</a:t>
+              <a:t>(source: Sarkar et al. 2018)</a:t>
             </a:r>
             <a:endParaRPr sz="1200">
               <a:latin typeface="Roboto"/>
@@ -26149,7 +26359,7 @@
       </p:sp>
       <p:sp>
         <p:nvSpPr>
-          <p:cNvPr id="240" name="Google Shape;240;p44"/>
+          <p:cNvPr id="242" name="Google Shape;242;p44"/>
           <p:cNvSpPr txBox="1"/>
           <p:nvPr/>
         </p:nvSpPr>
@@ -26207,7 +26417,7 @@
       </p:sp>
       <p:sp>
         <p:nvSpPr>
-          <p:cNvPr id="241" name="Google Shape;241;p44"/>
+          <p:cNvPr id="243" name="Google Shape;243;p44"/>
           <p:cNvSpPr txBox="1"/>
           <p:nvPr/>
         </p:nvSpPr>
@@ -26265,7 +26475,7 @@
       </p:sp>
       <p:sp>
         <p:nvSpPr>
-          <p:cNvPr id="242" name="Google Shape;242;p44"/>
+          <p:cNvPr id="244" name="Google Shape;244;p44"/>
           <p:cNvSpPr txBox="1"/>
           <p:nvPr/>
         </p:nvSpPr>
@@ -26323,7 +26533,7 @@
       </p:sp>
       <p:sp>
         <p:nvSpPr>
-          <p:cNvPr id="243" name="Google Shape;243;p44"/>
+          <p:cNvPr id="245" name="Google Shape;245;p44"/>
           <p:cNvSpPr txBox="1"/>
           <p:nvPr/>
         </p:nvSpPr>
@@ -26392,7 +26602,7 @@
   <p:cSld>
     <p:spTree>
       <p:nvGrpSpPr>
-        <p:cNvPr id="247" name="Shape 247"/>
+        <p:cNvPr id="249" name="Shape 249"/>
         <p:cNvGrpSpPr/>
         <p:nvPr/>
       </p:nvGrpSpPr>
@@ -26406,7 +26616,7 @@
       </p:grpSpPr>
       <p:pic>
         <p:nvPicPr>
-          <p:cNvPr id="248" name="Google Shape;248;p45"/>
+          <p:cNvPr id="250" name="Google Shape;250;p45"/>
           <p:cNvPicPr preferRelativeResize="0"/>
           <p:nvPr/>
         </p:nvPicPr>
@@ -26434,7 +26644,7 @@
       </p:pic>
       <p:sp>
         <p:nvSpPr>
-          <p:cNvPr id="249" name="Google Shape;249;p45"/>
+          <p:cNvPr id="251" name="Google Shape;251;p45"/>
           <p:cNvSpPr txBox="1"/>
           <p:nvPr>
             <p:ph type="title"/>
@@ -26455,7 +26665,7 @@
           </a:bodyPr>
           <a:lstStyle/>
           <a:p>
-            <a:pPr indent="0" lvl="0" marL="0" rtl="0" algn="l">
+            <a:pPr indent="0" lvl="0" marL="0" rtl="0" algn="ctr">
               <a:spcBef>
                 <a:spcPts val="0"/>
               </a:spcBef>
@@ -26482,7 +26692,7 @@
       </p:sp>
       <p:sp>
         <p:nvSpPr>
-          <p:cNvPr id="250" name="Google Shape;250;p45"/>
+          <p:cNvPr id="252" name="Google Shape;252;p45"/>
           <p:cNvSpPr txBox="1"/>
           <p:nvPr/>
         </p:nvSpPr>
@@ -26588,7 +26798,7 @@
       </p:sp>
       <p:sp>
         <p:nvSpPr>
-          <p:cNvPr id="251" name="Google Shape;251;p45"/>
+          <p:cNvPr id="253" name="Google Shape;253;p45"/>
           <p:cNvSpPr txBox="1"/>
           <p:nvPr>
             <p:ph idx="12" type="sldNum"/>
@@ -26636,14 +26846,14 @@
       </p:sp>
       <p:sp>
         <p:nvSpPr>
-          <p:cNvPr id="252" name="Google Shape;252;p45"/>
+          <p:cNvPr id="254" name="Google Shape;254;p45"/>
           <p:cNvSpPr txBox="1"/>
           <p:nvPr/>
         </p:nvSpPr>
         <p:spPr>
           <a:xfrm>
-            <a:off x="1948650" y="3423250"/>
-            <a:ext cx="690000" cy="400200"/>
+            <a:off x="1244225" y="3423250"/>
+            <a:ext cx="1394400" cy="400200"/>
           </a:xfrm>
           <a:prstGeom prst="rect">
             <a:avLst/>
@@ -26675,7 +26885,7 @@
                 <a:cs typeface="Roboto"/>
                 <a:sym typeface="Roboto"/>
               </a:rPr>
-              <a:t>(IBM)</a:t>
+              <a:t>(source: IBM)</a:t>
             </a:r>
             <a:endParaRPr>
               <a:latin typeface="Roboto"/>
@@ -26688,7 +26898,7 @@
       </p:sp>
       <p:pic>
         <p:nvPicPr>
-          <p:cNvPr id="253" name="Google Shape;253;p45"/>
+          <p:cNvPr id="255" name="Google Shape;255;p45"/>
           <p:cNvPicPr preferRelativeResize="0"/>
           <p:nvPr/>
         </p:nvPicPr>
@@ -27002,9 +27212,9 @@
 </file>
 
 <file path=ppt/theme/theme2.xml><?xml version="1.0" encoding="utf-8"?>
-<a:theme xmlns:a="http://schemas.openxmlformats.org/drawingml/2006/main" xmlns:r="http://schemas.openxmlformats.org/officeDocument/2006/relationships">
+<a:theme xmlns:a="http://schemas.openxmlformats.org/drawingml/2006/main" xmlns:r="http://schemas.openxmlformats.org/officeDocument/2006/relationships" name="Simple Light">
   <a:themeElements>
-    <a:clrScheme name="Default">
+    <a:clrScheme name="Simple Light">
       <a:dk1>
         <a:srgbClr val="000000"/>
       </a:dk1>
@@ -27012,34 +27222,34 @@
         <a:srgbClr val="FFFFFF"/>
       </a:lt1>
       <a:dk2>
-        <a:srgbClr val="158158"/>
+        <a:srgbClr val="595959"/>
       </a:dk2>
       <a:lt2>
-        <a:srgbClr val="F3F3F3"/>
+        <a:srgbClr val="EEEEEE"/>
       </a:lt2>
       <a:accent1>
-        <a:srgbClr val="058DC7"/>
+        <a:srgbClr val="4285F4"/>
       </a:accent1>
       <a:accent2>
-        <a:srgbClr val="50B432"/>
+        <a:srgbClr val="212121"/>
       </a:accent2>
       <a:accent3>
-        <a:srgbClr val="ED561B"/>
+        <a:srgbClr val="78909C"/>
       </a:accent3>
       <a:accent4>
-        <a:srgbClr val="EDEF00"/>
+        <a:srgbClr val="FFAB40"/>
       </a:accent4>
       <a:accent5>
-        <a:srgbClr val="24CBE5"/>
+        <a:srgbClr val="0097A7"/>
       </a:accent5>
       <a:accent6>
-        <a:srgbClr val="64E572"/>
+        <a:srgbClr val="EEFF41"/>
       </a:accent6>
       <a:hlink>
-        <a:srgbClr val="2200CC"/>
+        <a:srgbClr val="0097A7"/>
       </a:hlink>
       <a:folHlink>
-        <a:srgbClr val="551A8B"/>
+        <a:srgbClr val="0097A7"/>
       </a:folHlink>
     </a:clrScheme>
     <a:fontScheme name="Office">
@@ -27281,9 +27491,9 @@
 </file>
 
 <file path=ppt/theme/theme3.xml><?xml version="1.0" encoding="utf-8"?>
-<a:theme xmlns:a="http://schemas.openxmlformats.org/drawingml/2006/main" xmlns:r="http://schemas.openxmlformats.org/officeDocument/2006/relationships" name="Simple Light">
+<a:theme xmlns:a="http://schemas.openxmlformats.org/drawingml/2006/main" xmlns:r="http://schemas.openxmlformats.org/officeDocument/2006/relationships">
   <a:themeElements>
-    <a:clrScheme name="Simple Light">
+    <a:clrScheme name="Default">
       <a:dk1>
         <a:srgbClr val="000000"/>
       </a:dk1>
@@ -27291,34 +27501,34 @@
         <a:srgbClr val="FFFFFF"/>
       </a:lt1>
       <a:dk2>
-        <a:srgbClr val="595959"/>
+        <a:srgbClr val="158158"/>
       </a:dk2>
       <a:lt2>
-        <a:srgbClr val="EEEEEE"/>
+        <a:srgbClr val="F3F3F3"/>
       </a:lt2>
       <a:accent1>
-        <a:srgbClr val="4285F4"/>
+        <a:srgbClr val="058DC7"/>
       </a:accent1>
       <a:accent2>
-        <a:srgbClr val="212121"/>
+        <a:srgbClr val="50B432"/>
       </a:accent2>
       <a:accent3>
-        <a:srgbClr val="78909C"/>
+        <a:srgbClr val="ED561B"/>
       </a:accent3>
       <a:accent4>
-        <a:srgbClr val="FFAB40"/>
+        <a:srgbClr val="EDEF00"/>
       </a:accent4>
       <a:accent5>
-        <a:srgbClr val="0097A7"/>
+        <a:srgbClr val="24CBE5"/>
       </a:accent5>
       <a:accent6>
-        <a:srgbClr val="EEFF41"/>
+        <a:srgbClr val="64E572"/>
       </a:accent6>
       <a:hlink>
-        <a:srgbClr val="0097A7"/>
+        <a:srgbClr val="2200CC"/>
       </a:hlink>
       <a:folHlink>
-        <a:srgbClr val="0097A7"/>
+        <a:srgbClr val="551A8B"/>
       </a:folHlink>
     </a:clrScheme>
     <a:fontScheme name="Office">

</xml_diff>

<commit_message>
add supplementary topics for Day 4 lecture
</commit_message>
<xml_diff>
--- a/Day_4/Lectures/Day_4_Lecture_2_Model_Tuning_Interpretation_Deployment.pptx
+++ b/Day_4/Lectures/Day_4_Lecture_2_Model_Tuning_Interpretation_Deployment.pptx
@@ -27236,285 +27236,6 @@
 </file>
 
 <file path=ppt/theme/theme2.xml><?xml version="1.0" encoding="utf-8"?>
-<a:theme xmlns:a="http://schemas.openxmlformats.org/drawingml/2006/main" xmlns:r="http://schemas.openxmlformats.org/officeDocument/2006/relationships">
-  <a:themeElements>
-    <a:clrScheme name="Default">
-      <a:dk1>
-        <a:srgbClr val="000000"/>
-      </a:dk1>
-      <a:lt1>
-        <a:srgbClr val="FFFFFF"/>
-      </a:lt1>
-      <a:dk2>
-        <a:srgbClr val="158158"/>
-      </a:dk2>
-      <a:lt2>
-        <a:srgbClr val="F3F3F3"/>
-      </a:lt2>
-      <a:accent1>
-        <a:srgbClr val="058DC7"/>
-      </a:accent1>
-      <a:accent2>
-        <a:srgbClr val="50B432"/>
-      </a:accent2>
-      <a:accent3>
-        <a:srgbClr val="ED561B"/>
-      </a:accent3>
-      <a:accent4>
-        <a:srgbClr val="EDEF00"/>
-      </a:accent4>
-      <a:accent5>
-        <a:srgbClr val="24CBE5"/>
-      </a:accent5>
-      <a:accent6>
-        <a:srgbClr val="64E572"/>
-      </a:accent6>
-      <a:hlink>
-        <a:srgbClr val="2200CC"/>
-      </a:hlink>
-      <a:folHlink>
-        <a:srgbClr val="551A8B"/>
-      </a:folHlink>
-    </a:clrScheme>
-    <a:fontScheme name="Office">
-      <a:majorFont>
-        <a:latin typeface="Arial"/>
-        <a:ea typeface=""/>
-        <a:cs typeface=""/>
-        <a:font script="Jpan" typeface="ＭＳ Ｐゴシック"/>
-        <a:font script="Hang" typeface="맑은 고딕"/>
-        <a:font script="Hans" typeface="宋体"/>
-        <a:font script="Hant" typeface="新細明體"/>
-        <a:font script="Arab" typeface="Times New Roman"/>
-        <a:font script="Hebr" typeface="Times New Roman"/>
-        <a:font script="Thai" typeface="Angsana New"/>
-        <a:font script="Ethi" typeface="Nyala"/>
-        <a:font script="Beng" typeface="Vrinda"/>
-        <a:font script="Gujr" typeface="Shruti"/>
-        <a:font script="Khmr" typeface="MoolBoran"/>
-        <a:font script="Knda" typeface="Tunga"/>
-        <a:font script="Guru" typeface="Raavi"/>
-        <a:font script="Cans" typeface="Euphemia"/>
-        <a:font script="Cher" typeface="Plantagenet Cherokee"/>
-        <a:font script="Yiii" typeface="Microsoft Yi Baiti"/>
-        <a:font script="Tibt" typeface="Microsoft Himalaya"/>
-        <a:font script="Thaa" typeface="MV Boli"/>
-        <a:font script="Deva" typeface="Mangal"/>
-        <a:font script="Telu" typeface="Gautami"/>
-        <a:font script="Taml" typeface="Latha"/>
-        <a:font script="Syrc" typeface="Estrangelo Edessa"/>
-        <a:font script="Orya" typeface="Kalinga"/>
-        <a:font script="Mlym" typeface="Kartika"/>
-        <a:font script="Laoo" typeface="DokChampa"/>
-        <a:font script="Sinh" typeface="Iskoola Pota"/>
-        <a:font script="Mong" typeface="Mongolian Baiti"/>
-        <a:font script="Viet" typeface="Times New Roman"/>
-        <a:font script="Uigh" typeface="Microsoft Uighur"/>
-        <a:font script="Geor" typeface="Sylfaen"/>
-      </a:majorFont>
-      <a:minorFont>
-        <a:latin typeface="Arial"/>
-        <a:ea typeface=""/>
-        <a:cs typeface=""/>
-        <a:font script="Jpan" typeface="ＭＳ Ｐゴシック"/>
-        <a:font script="Hang" typeface="맑은 고딕"/>
-        <a:font script="Hans" typeface="宋体"/>
-        <a:font script="Hant" typeface="新細明體"/>
-        <a:font script="Arab" typeface="Arial"/>
-        <a:font script="Hebr" typeface="Arial"/>
-        <a:font script="Thai" typeface="Cordia New"/>
-        <a:font script="Ethi" typeface="Nyala"/>
-        <a:font script="Beng" typeface="Vrinda"/>
-        <a:font script="Gujr" typeface="Shruti"/>
-        <a:font script="Khmr" typeface="DaunPenh"/>
-        <a:font script="Knda" typeface="Tunga"/>
-        <a:font script="Guru" typeface="Raavi"/>
-        <a:font script="Cans" typeface="Euphemia"/>
-        <a:font script="Cher" typeface="Plantagenet Cherokee"/>
-        <a:font script="Yiii" typeface="Microsoft Yi Baiti"/>
-        <a:font script="Tibt" typeface="Microsoft Himalaya"/>
-        <a:font script="Thaa" typeface="MV Boli"/>
-        <a:font script="Deva" typeface="Mangal"/>
-        <a:font script="Telu" typeface="Gautami"/>
-        <a:font script="Taml" typeface="Latha"/>
-        <a:font script="Syrc" typeface="Estrangelo Edessa"/>
-        <a:font script="Orya" typeface="Kalinga"/>
-        <a:font script="Mlym" typeface="Kartika"/>
-        <a:font script="Laoo" typeface="DokChampa"/>
-        <a:font script="Sinh" typeface="Iskoola Pota"/>
-        <a:font script="Mong" typeface="Mongolian Baiti"/>
-        <a:font script="Viet" typeface="Arial"/>
-        <a:font script="Uigh" typeface="Microsoft Uighur"/>
-        <a:font script="Geor" typeface="Sylfaen"/>
-      </a:minorFont>
-    </a:fontScheme>
-    <a:fmtScheme name="Office">
-      <a:fillStyleLst>
-        <a:solidFill>
-          <a:schemeClr val="phClr"/>
-        </a:solidFill>
-        <a:gradFill rotWithShape="1">
-          <a:gsLst>
-            <a:gs pos="0">
-              <a:schemeClr val="phClr">
-                <a:tint val="50000"/>
-                <a:satMod val="300000"/>
-              </a:schemeClr>
-            </a:gs>
-            <a:gs pos="35000">
-              <a:schemeClr val="phClr">
-                <a:tint val="37000"/>
-                <a:satMod val="300000"/>
-              </a:schemeClr>
-            </a:gs>
-            <a:gs pos="100000">
-              <a:schemeClr val="phClr">
-                <a:tint val="15000"/>
-                <a:satMod val="350000"/>
-              </a:schemeClr>
-            </a:gs>
-          </a:gsLst>
-          <a:lin ang="16200000" scaled="1"/>
-        </a:gradFill>
-        <a:gradFill rotWithShape="1">
-          <a:gsLst>
-            <a:gs pos="0">
-              <a:schemeClr val="phClr">
-                <a:tint val="100000"/>
-                <a:shade val="100000"/>
-                <a:satMod val="130000"/>
-              </a:schemeClr>
-            </a:gs>
-            <a:gs pos="100000">
-              <a:schemeClr val="phClr">
-                <a:tint val="50000"/>
-                <a:shade val="100000"/>
-                <a:satMod val="350000"/>
-              </a:schemeClr>
-            </a:gs>
-          </a:gsLst>
-          <a:lin ang="16200000" scaled="0"/>
-        </a:gradFill>
-      </a:fillStyleLst>
-      <a:lnStyleLst>
-        <a:ln w="9525" cap="flat" cmpd="sng" algn="ctr">
-          <a:solidFill>
-            <a:schemeClr val="phClr">
-              <a:shade val="95000"/>
-              <a:satMod val="105000"/>
-            </a:schemeClr>
-          </a:solidFill>
-          <a:prstDash val="solid"/>
-        </a:ln>
-        <a:ln w="25400" cap="flat" cmpd="sng" algn="ctr">
-          <a:solidFill>
-            <a:schemeClr val="phClr"/>
-          </a:solidFill>
-          <a:prstDash val="solid"/>
-        </a:ln>
-        <a:ln w="38100" cap="flat" cmpd="sng" algn="ctr">
-          <a:solidFill>
-            <a:schemeClr val="phClr"/>
-          </a:solidFill>
-          <a:prstDash val="solid"/>
-        </a:ln>
-      </a:lnStyleLst>
-      <a:effectStyleLst>
-        <a:effectStyle>
-          <a:effectLst>
-            <a:outerShdw blurRad="40000" dist="20000" dir="5400000" rotWithShape="0">
-              <a:srgbClr val="000000">
-                <a:alpha val="38000"/>
-              </a:srgbClr>
-            </a:outerShdw>
-          </a:effectLst>
-        </a:effectStyle>
-        <a:effectStyle>
-          <a:effectLst>
-            <a:outerShdw blurRad="40000" dist="23000" dir="5400000" rotWithShape="0">
-              <a:srgbClr val="000000">
-                <a:alpha val="35000"/>
-              </a:srgbClr>
-            </a:outerShdw>
-          </a:effectLst>
-        </a:effectStyle>
-        <a:effectStyle>
-          <a:effectLst>
-            <a:outerShdw blurRad="40000" dist="23000" dir="5400000" rotWithShape="0">
-              <a:srgbClr val="000000">
-                <a:alpha val="35000"/>
-              </a:srgbClr>
-            </a:outerShdw>
-          </a:effectLst>
-          <a:scene3d>
-            <a:camera prst="orthographicFront">
-              <a:rot lat="0" lon="0" rev="0"/>
-            </a:camera>
-            <a:lightRig rig="threePt" dir="t">
-              <a:rot lat="0" lon="0" rev="1200000"/>
-            </a:lightRig>
-          </a:scene3d>
-          <a:sp3d>
-            <a:bevelT w="63500" h="25400"/>
-          </a:sp3d>
-        </a:effectStyle>
-      </a:effectStyleLst>
-      <a:bgFillStyleLst>
-        <a:solidFill>
-          <a:schemeClr val="phClr"/>
-        </a:solidFill>
-        <a:gradFill rotWithShape="1">
-          <a:gsLst>
-            <a:gs pos="0">
-              <a:schemeClr val="phClr">
-                <a:tint val="40000"/>
-                <a:satMod val="350000"/>
-              </a:schemeClr>
-            </a:gs>
-            <a:gs pos="40000">
-              <a:schemeClr val="phClr">
-                <a:tint val="45000"/>
-                <a:shade val="99000"/>
-                <a:satMod val="350000"/>
-              </a:schemeClr>
-            </a:gs>
-            <a:gs pos="100000">
-              <a:schemeClr val="phClr">
-                <a:shade val="20000"/>
-                <a:satMod val="255000"/>
-              </a:schemeClr>
-            </a:gs>
-          </a:gsLst>
-          <a:path path="circle">
-            <a:fillToRect l="50000" t="-80000" r="50000" b="180000"/>
-          </a:path>
-        </a:gradFill>
-        <a:gradFill rotWithShape="1">
-          <a:gsLst>
-            <a:gs pos="0">
-              <a:schemeClr val="phClr">
-                <a:tint val="80000"/>
-                <a:satMod val="300000"/>
-              </a:schemeClr>
-            </a:gs>
-            <a:gs pos="100000">
-              <a:schemeClr val="phClr">
-                <a:shade val="30000"/>
-                <a:satMod val="200000"/>
-              </a:schemeClr>
-            </a:gs>
-          </a:gsLst>
-          <a:path path="circle">
-            <a:fillToRect l="50000" t="50000" r="50000" b="50000"/>
-          </a:path>
-        </a:gradFill>
-      </a:bgFillStyleLst>
-    </a:fmtScheme>
-  </a:themeElements>
-</a:theme>
-</file>
-
-<file path=ppt/theme/theme3.xml><?xml version="1.0" encoding="utf-8"?>
 <a:theme xmlns:a="http://schemas.openxmlformats.org/drawingml/2006/main" xmlns:r="http://schemas.openxmlformats.org/officeDocument/2006/relationships" name="Geometric">
   <a:themeElements>
     <a:clrScheme name="Geometric">
@@ -27793,7 +27514,7 @@
 </a:theme>
 </file>
 
-<file path=ppt/theme/theme4.xml><?xml version="1.0" encoding="utf-8"?>
+<file path=ppt/theme/theme3.xml><?xml version="1.0" encoding="utf-8"?>
 <a:theme xmlns:a="http://schemas.openxmlformats.org/drawingml/2006/main" xmlns:r="http://schemas.openxmlformats.org/officeDocument/2006/relationships" name="Simple Light">
   <a:themeElements>
     <a:clrScheme name="Simple Light">
@@ -28070,4 +27791,283 @@
     </a:fmtScheme>
   </a:themeElements>
 </a:theme>
+</file>
+
+<file path=ppt/theme/theme4.xml><?xml version="1.0" encoding="utf-8"?>
+<a:theme xmlns:a="http://schemas.openxmlformats.org/drawingml/2006/main" xmlns:r="http://schemas.openxmlformats.org/officeDocument/2006/relationships">
+  <a:themeElements>
+    <a:clrScheme name="Default">
+      <a:dk1>
+        <a:srgbClr val="000000"/>
+      </a:dk1>
+      <a:lt1>
+        <a:srgbClr val="FFFFFF"/>
+      </a:lt1>
+      <a:dk2>
+        <a:srgbClr val="158158"/>
+      </a:dk2>
+      <a:lt2>
+        <a:srgbClr val="F3F3F3"/>
+      </a:lt2>
+      <a:accent1>
+        <a:srgbClr val="058DC7"/>
+      </a:accent1>
+      <a:accent2>
+        <a:srgbClr val="50B432"/>
+      </a:accent2>
+      <a:accent3>
+        <a:srgbClr val="ED561B"/>
+      </a:accent3>
+      <a:accent4>
+        <a:srgbClr val="EDEF00"/>
+      </a:accent4>
+      <a:accent5>
+        <a:srgbClr val="24CBE5"/>
+      </a:accent5>
+      <a:accent6>
+        <a:srgbClr val="64E572"/>
+      </a:accent6>
+      <a:hlink>
+        <a:srgbClr val="2200CC"/>
+      </a:hlink>
+      <a:folHlink>
+        <a:srgbClr val="551A8B"/>
+      </a:folHlink>
+    </a:clrScheme>
+    <a:fontScheme name="Office">
+      <a:majorFont>
+        <a:latin typeface="Arial"/>
+        <a:ea typeface=""/>
+        <a:cs typeface=""/>
+        <a:font script="Jpan" typeface="ＭＳ Ｐゴシック"/>
+        <a:font script="Hang" typeface="맑은 고딕"/>
+        <a:font script="Hans" typeface="宋体"/>
+        <a:font script="Hant" typeface="新細明體"/>
+        <a:font script="Arab" typeface="Times New Roman"/>
+        <a:font script="Hebr" typeface="Times New Roman"/>
+        <a:font script="Thai" typeface="Angsana New"/>
+        <a:font script="Ethi" typeface="Nyala"/>
+        <a:font script="Beng" typeface="Vrinda"/>
+        <a:font script="Gujr" typeface="Shruti"/>
+        <a:font script="Khmr" typeface="MoolBoran"/>
+        <a:font script="Knda" typeface="Tunga"/>
+        <a:font script="Guru" typeface="Raavi"/>
+        <a:font script="Cans" typeface="Euphemia"/>
+        <a:font script="Cher" typeface="Plantagenet Cherokee"/>
+        <a:font script="Yiii" typeface="Microsoft Yi Baiti"/>
+        <a:font script="Tibt" typeface="Microsoft Himalaya"/>
+        <a:font script="Thaa" typeface="MV Boli"/>
+        <a:font script="Deva" typeface="Mangal"/>
+        <a:font script="Telu" typeface="Gautami"/>
+        <a:font script="Taml" typeface="Latha"/>
+        <a:font script="Syrc" typeface="Estrangelo Edessa"/>
+        <a:font script="Orya" typeface="Kalinga"/>
+        <a:font script="Mlym" typeface="Kartika"/>
+        <a:font script="Laoo" typeface="DokChampa"/>
+        <a:font script="Sinh" typeface="Iskoola Pota"/>
+        <a:font script="Mong" typeface="Mongolian Baiti"/>
+        <a:font script="Viet" typeface="Times New Roman"/>
+        <a:font script="Uigh" typeface="Microsoft Uighur"/>
+        <a:font script="Geor" typeface="Sylfaen"/>
+      </a:majorFont>
+      <a:minorFont>
+        <a:latin typeface="Arial"/>
+        <a:ea typeface=""/>
+        <a:cs typeface=""/>
+        <a:font script="Jpan" typeface="ＭＳ Ｐゴシック"/>
+        <a:font script="Hang" typeface="맑은 고딕"/>
+        <a:font script="Hans" typeface="宋体"/>
+        <a:font script="Hant" typeface="新細明體"/>
+        <a:font script="Arab" typeface="Arial"/>
+        <a:font script="Hebr" typeface="Arial"/>
+        <a:font script="Thai" typeface="Cordia New"/>
+        <a:font script="Ethi" typeface="Nyala"/>
+        <a:font script="Beng" typeface="Vrinda"/>
+        <a:font script="Gujr" typeface="Shruti"/>
+        <a:font script="Khmr" typeface="DaunPenh"/>
+        <a:font script="Knda" typeface="Tunga"/>
+        <a:font script="Guru" typeface="Raavi"/>
+        <a:font script="Cans" typeface="Euphemia"/>
+        <a:font script="Cher" typeface="Plantagenet Cherokee"/>
+        <a:font script="Yiii" typeface="Microsoft Yi Baiti"/>
+        <a:font script="Tibt" typeface="Microsoft Himalaya"/>
+        <a:font script="Thaa" typeface="MV Boli"/>
+        <a:font script="Deva" typeface="Mangal"/>
+        <a:font script="Telu" typeface="Gautami"/>
+        <a:font script="Taml" typeface="Latha"/>
+        <a:font script="Syrc" typeface="Estrangelo Edessa"/>
+        <a:font script="Orya" typeface="Kalinga"/>
+        <a:font script="Mlym" typeface="Kartika"/>
+        <a:font script="Laoo" typeface="DokChampa"/>
+        <a:font script="Sinh" typeface="Iskoola Pota"/>
+        <a:font script="Mong" typeface="Mongolian Baiti"/>
+        <a:font script="Viet" typeface="Arial"/>
+        <a:font script="Uigh" typeface="Microsoft Uighur"/>
+        <a:font script="Geor" typeface="Sylfaen"/>
+      </a:minorFont>
+    </a:fontScheme>
+    <a:fmtScheme name="Office">
+      <a:fillStyleLst>
+        <a:solidFill>
+          <a:schemeClr val="phClr"/>
+        </a:solidFill>
+        <a:gradFill rotWithShape="1">
+          <a:gsLst>
+            <a:gs pos="0">
+              <a:schemeClr val="phClr">
+                <a:tint val="50000"/>
+                <a:satMod val="300000"/>
+              </a:schemeClr>
+            </a:gs>
+            <a:gs pos="35000">
+              <a:schemeClr val="phClr">
+                <a:tint val="37000"/>
+                <a:satMod val="300000"/>
+              </a:schemeClr>
+            </a:gs>
+            <a:gs pos="100000">
+              <a:schemeClr val="phClr">
+                <a:tint val="15000"/>
+                <a:satMod val="350000"/>
+              </a:schemeClr>
+            </a:gs>
+          </a:gsLst>
+          <a:lin ang="16200000" scaled="1"/>
+        </a:gradFill>
+        <a:gradFill rotWithShape="1">
+          <a:gsLst>
+            <a:gs pos="0">
+              <a:schemeClr val="phClr">
+                <a:tint val="100000"/>
+                <a:shade val="100000"/>
+                <a:satMod val="130000"/>
+              </a:schemeClr>
+            </a:gs>
+            <a:gs pos="100000">
+              <a:schemeClr val="phClr">
+                <a:tint val="50000"/>
+                <a:shade val="100000"/>
+                <a:satMod val="350000"/>
+              </a:schemeClr>
+            </a:gs>
+          </a:gsLst>
+          <a:lin ang="16200000" scaled="0"/>
+        </a:gradFill>
+      </a:fillStyleLst>
+      <a:lnStyleLst>
+        <a:ln w="9525" cap="flat" cmpd="sng" algn="ctr">
+          <a:solidFill>
+            <a:schemeClr val="phClr">
+              <a:shade val="95000"/>
+              <a:satMod val="105000"/>
+            </a:schemeClr>
+          </a:solidFill>
+          <a:prstDash val="solid"/>
+        </a:ln>
+        <a:ln w="25400" cap="flat" cmpd="sng" algn="ctr">
+          <a:solidFill>
+            <a:schemeClr val="phClr"/>
+          </a:solidFill>
+          <a:prstDash val="solid"/>
+        </a:ln>
+        <a:ln w="38100" cap="flat" cmpd="sng" algn="ctr">
+          <a:solidFill>
+            <a:schemeClr val="phClr"/>
+          </a:solidFill>
+          <a:prstDash val="solid"/>
+        </a:ln>
+      </a:lnStyleLst>
+      <a:effectStyleLst>
+        <a:effectStyle>
+          <a:effectLst>
+            <a:outerShdw blurRad="40000" dist="20000" dir="5400000" rotWithShape="0">
+              <a:srgbClr val="000000">
+                <a:alpha val="38000"/>
+              </a:srgbClr>
+            </a:outerShdw>
+          </a:effectLst>
+        </a:effectStyle>
+        <a:effectStyle>
+          <a:effectLst>
+            <a:outerShdw blurRad="40000" dist="23000" dir="5400000" rotWithShape="0">
+              <a:srgbClr val="000000">
+                <a:alpha val="35000"/>
+              </a:srgbClr>
+            </a:outerShdw>
+          </a:effectLst>
+        </a:effectStyle>
+        <a:effectStyle>
+          <a:effectLst>
+            <a:outerShdw blurRad="40000" dist="23000" dir="5400000" rotWithShape="0">
+              <a:srgbClr val="000000">
+                <a:alpha val="35000"/>
+              </a:srgbClr>
+            </a:outerShdw>
+          </a:effectLst>
+          <a:scene3d>
+            <a:camera prst="orthographicFront">
+              <a:rot lat="0" lon="0" rev="0"/>
+            </a:camera>
+            <a:lightRig rig="threePt" dir="t">
+              <a:rot lat="0" lon="0" rev="1200000"/>
+            </a:lightRig>
+          </a:scene3d>
+          <a:sp3d>
+            <a:bevelT w="63500" h="25400"/>
+          </a:sp3d>
+        </a:effectStyle>
+      </a:effectStyleLst>
+      <a:bgFillStyleLst>
+        <a:solidFill>
+          <a:schemeClr val="phClr"/>
+        </a:solidFill>
+        <a:gradFill rotWithShape="1">
+          <a:gsLst>
+            <a:gs pos="0">
+              <a:schemeClr val="phClr">
+                <a:tint val="40000"/>
+                <a:satMod val="350000"/>
+              </a:schemeClr>
+            </a:gs>
+            <a:gs pos="40000">
+              <a:schemeClr val="phClr">
+                <a:tint val="45000"/>
+                <a:shade val="99000"/>
+                <a:satMod val="350000"/>
+              </a:schemeClr>
+            </a:gs>
+            <a:gs pos="100000">
+              <a:schemeClr val="phClr">
+                <a:shade val="20000"/>
+                <a:satMod val="255000"/>
+              </a:schemeClr>
+            </a:gs>
+          </a:gsLst>
+          <a:path path="circle">
+            <a:fillToRect l="50000" t="-80000" r="50000" b="180000"/>
+          </a:path>
+        </a:gradFill>
+        <a:gradFill rotWithShape="1">
+          <a:gsLst>
+            <a:gs pos="0">
+              <a:schemeClr val="phClr">
+                <a:tint val="80000"/>
+                <a:satMod val="300000"/>
+              </a:schemeClr>
+            </a:gs>
+            <a:gs pos="100000">
+              <a:schemeClr val="phClr">
+                <a:shade val="30000"/>
+                <a:satMod val="200000"/>
+              </a:schemeClr>
+            </a:gs>
+          </a:gsLst>
+          <a:path path="circle">
+            <a:fillToRect l="50000" t="50000" r="50000" b="50000"/>
+          </a:path>
+        </a:gradFill>
+      </a:bgFillStyleLst>
+    </a:fmtScheme>
+  </a:themeElements>
+</a:theme>
 </file>
</xml_diff>